<commit_message>
update for on the edge
</commit_message>
<xml_diff>
--- a/iot-clientdev/images/iot-clientdev.pptx
+++ b/iot-clientdev/images/iot-clientdev.pptx
@@ -6,15 +6,16 @@
     <p:sldMasterId id="2147484642" r:id="rId5"/>
   </p:sldMasterIdLst>
   <p:notesMasterIdLst>
-    <p:notesMasterId r:id="rId9"/>
+    <p:notesMasterId r:id="rId10"/>
   </p:notesMasterIdLst>
   <p:handoutMasterIdLst>
-    <p:handoutMasterId r:id="rId10"/>
+    <p:handoutMasterId r:id="rId11"/>
   </p:handoutMasterIdLst>
   <p:sldIdLst>
     <p:sldId id="256" r:id="rId6"/>
-    <p:sldId id="257" r:id="rId7"/>
-    <p:sldId id="259" r:id="rId8"/>
+    <p:sldId id="260" r:id="rId7"/>
+    <p:sldId id="257" r:id="rId8"/>
+    <p:sldId id="259" r:id="rId9"/>
   </p:sldIdLst>
   <p:sldSz cx="12192000" cy="6858000"/>
   <p:notesSz cx="6858000" cy="9144000"/>
@@ -242,7 +243,7 @@
               <a:rPr lang="en-US" smtClean="0">
                 <a:latin typeface="Segoe UI" pitchFamily="34" charset="0"/>
               </a:rPr>
-              <a:t>4/5/19 11:04 AM</a:t>
+              <a:t>5/13/19 1:46 PM</a:t>
             </a:fld>
             <a:endParaRPr lang="en-US" dirty="0">
               <a:latin typeface="Segoe UI" pitchFamily="34" charset="0"/>
@@ -520,7 +521,7 @@
           <a:p>
             <a:fld id="{386CE63F-9E7F-4C04-9D0D-FCA25A8E9E86}" type="datetime8">
               <a:rPr lang="en-US" smtClean="0"/>
-              <a:t>4/5/19 11:04 AM</a:t>
+              <a:t>5/13/19 1:46 PM</a:t>
             </a:fld>
             <a:endParaRPr lang="en-US" dirty="0"/>
           </a:p>
@@ -931,7 +932,7 @@
           <a:p>
             <a:fld id="{386CE63F-9E7F-4C04-9D0D-FCA25A8E9E86}" type="datetime8">
               <a:rPr lang="en-US" smtClean="0"/>
-              <a:t>4/5/19 11:32 AM</a:t>
+              <a:t>5/13/19 1:46 PM</a:t>
             </a:fld>
             <a:endParaRPr lang="en-US" dirty="0"/>
           </a:p>
@@ -955,7 +956,7 @@
             <a:fld id="{B4008EB6-D09E-4580-8CD6-DDB14511944F}" type="slidenum">
               <a:rPr lang="en-US" smtClean="0"/>
               <a:pPr/>
-              <a:t>3</a:t>
+              <a:t>4</a:t>
             </a:fld>
             <a:endParaRPr lang="en-US" dirty="0"/>
           </a:p>
@@ -1172,7 +1173,7 @@
       </p:transition>
     </mc:Fallback>
   </mc:AlternateContent>
-  <p:extLst mod="1">
+  <p:extLst>
     <p:ext uri="{DCECCB84-F9BA-43D5-87BE-67443E8EF086}">
       <p15:sldGuideLst xmlns:p15="http://schemas.microsoft.com/office/powerpoint/2012/main">
         <p15:guide id="2" orient="horz" pos="2496" userDrawn="1">
@@ -1265,7 +1266,7 @@
   <p:transition>
     <p:fade/>
   </p:transition>
-  <p:extLst mod="1">
+  <p:extLst>
     <p:ext uri="{DCECCB84-F9BA-43D5-87BE-67443E8EF086}">
       <p15:sldGuideLst xmlns:p15="http://schemas.microsoft.com/office/powerpoint/2012/main">
         <p15:guide id="6" pos="779">
@@ -1470,7 +1471,7 @@
   <p:transition>
     <p:fade/>
   </p:transition>
-  <p:extLst mod="1">
+  <p:extLst>
     <p:ext uri="{DCECCB84-F9BA-43D5-87BE-67443E8EF086}">
       <p15:sldGuideLst xmlns:p15="http://schemas.microsoft.com/office/powerpoint/2012/main">
         <p15:guide id="6" pos="779">
@@ -1810,7 +1811,7 @@
   <p:transition>
     <p:fade/>
   </p:transition>
-  <p:extLst mod="1">
+  <p:extLst>
     <p:ext uri="{DCECCB84-F9BA-43D5-87BE-67443E8EF086}">
       <p15:sldGuideLst xmlns:p15="http://schemas.microsoft.com/office/powerpoint/2012/main">
         <p15:guide id="2" pos="3359" userDrawn="1">
@@ -1993,7 +1994,7 @@
   <p:transition>
     <p:fade/>
   </p:transition>
-  <p:extLst mod="1">
+  <p:extLst>
     <p:ext uri="{DCECCB84-F9BA-43D5-87BE-67443E8EF086}">
       <p15:sldGuideLst xmlns:p15="http://schemas.microsoft.com/office/powerpoint/2012/main">
         <p15:guide id="2" pos="3359">
@@ -2161,7 +2162,7 @@
   <p:transition>
     <p:fade/>
   </p:transition>
-  <p:extLst mod="1">
+  <p:extLst>
     <p:ext uri="{DCECCB84-F9BA-43D5-87BE-67443E8EF086}">
       <p15:sldGuideLst xmlns:p15="http://schemas.microsoft.com/office/powerpoint/2012/main">
         <p15:guide id="2" pos="3360">
@@ -2340,7 +2341,7 @@
       </p:transition>
     </mc:Fallback>
   </mc:AlternateContent>
-  <p:extLst mod="1">
+  <p:extLst>
     <p:ext uri="{DCECCB84-F9BA-43D5-87BE-67443E8EF086}">
       <p15:sldGuideLst xmlns:p15="http://schemas.microsoft.com/office/powerpoint/2012/main">
         <p15:guide id="1" orient="horz" pos="2160" userDrawn="1">
@@ -2529,7 +2530,7 @@
       </p:transition>
     </mc:Fallback>
   </mc:AlternateContent>
-  <p:extLst mod="1">
+  <p:extLst>
     <p:ext uri="{DCECCB84-F9BA-43D5-87BE-67443E8EF086}">
       <p15:sldGuideLst xmlns:p15="http://schemas.microsoft.com/office/powerpoint/2012/main">
         <p15:guide id="1" orient="horz" pos="2160">
@@ -2662,7 +2663,7 @@
       </p:transition>
     </mc:Fallback>
   </mc:AlternateContent>
-  <p:extLst mod="1">
+  <p:extLst>
     <p:ext uri="{DCECCB84-F9BA-43D5-87BE-67443E8EF086}">
       <p15:sldGuideLst xmlns:p15="http://schemas.microsoft.com/office/powerpoint/2012/main">
         <p15:guide id="1" orient="horz" pos="2160">
@@ -2795,7 +2796,7 @@
       </p:transition>
     </mc:Fallback>
   </mc:AlternateContent>
-  <p:extLst mod="1">
+  <p:extLst>
     <p:ext uri="{DCECCB84-F9BA-43D5-87BE-67443E8EF086}">
       <p15:sldGuideLst xmlns:p15="http://schemas.microsoft.com/office/powerpoint/2012/main">
         <p15:guide id="1" orient="horz" pos="2160">
@@ -2928,7 +2929,7 @@
       </p:transition>
     </mc:Fallback>
   </mc:AlternateContent>
-  <p:extLst mod="1">
+  <p:extLst>
     <p:ext uri="{DCECCB84-F9BA-43D5-87BE-67443E8EF086}">
       <p15:sldGuideLst xmlns:p15="http://schemas.microsoft.com/office/powerpoint/2012/main">
         <p15:guide id="1" orient="horz" pos="2160" userDrawn="1">
@@ -3152,7 +3153,7 @@
       </p:transition>
     </mc:Fallback>
   </mc:AlternateContent>
-  <p:extLst mod="1">
+  <p:extLst>
     <p:ext uri="{DCECCB84-F9BA-43D5-87BE-67443E8EF086}">
       <p15:sldGuideLst xmlns:p15="http://schemas.microsoft.com/office/powerpoint/2012/main">
         <p15:guide id="2" orient="horz" pos="2496">
@@ -3290,7 +3291,7 @@
       </p:transition>
     </mc:Fallback>
   </mc:AlternateContent>
-  <p:extLst mod="1">
+  <p:extLst>
     <p:ext uri="{DCECCB84-F9BA-43D5-87BE-67443E8EF086}">
       <p15:sldGuideLst xmlns:p15="http://schemas.microsoft.com/office/powerpoint/2012/main">
         <p15:guide id="1" orient="horz" pos="2160">
@@ -3349,7 +3350,7 @@
   <p:transition>
     <p:fade/>
   </p:transition>
-  <p:extLst mod="1">
+  <p:extLst>
     <p:ext uri="{DCECCB84-F9BA-43D5-87BE-67443E8EF086}">
       <p15:sldGuideLst xmlns:p15="http://schemas.microsoft.com/office/powerpoint/2012/main">
         <p15:guide id="1" orient="horz" pos="1272" userDrawn="1">
@@ -3408,7 +3409,7 @@
   <p:transition>
     <p:fade/>
   </p:transition>
-  <p:extLst mod="1">
+  <p:extLst>
     <p:ext uri="{DCECCB84-F9BA-43D5-87BE-67443E8EF086}">
       <p15:sldGuideLst xmlns:p15="http://schemas.microsoft.com/office/powerpoint/2012/main">
         <p15:guide id="1" orient="horz" pos="904" userDrawn="1">
@@ -3680,7 +3681,7 @@
   <p:transition>
     <p:fade/>
   </p:transition>
-  <p:extLst mod="1">
+  <p:extLst>
     <p:ext uri="{DCECCB84-F9BA-43D5-87BE-67443E8EF086}">
       <p15:sldGuideLst xmlns:p15="http://schemas.microsoft.com/office/powerpoint/2012/main">
         <p15:guide id="1" orient="horz" pos="1272" userDrawn="1">
@@ -4088,7 +4089,7 @@
   <p:transition>
     <p:fade/>
   </p:transition>
-  <p:extLst mod="1">
+  <p:extLst>
     <p:ext uri="{DCECCB84-F9BA-43D5-87BE-67443E8EF086}">
       <p15:sldGuideLst xmlns:p15="http://schemas.microsoft.com/office/powerpoint/2012/main">
         <p15:guide id="1" orient="horz" pos="904" userDrawn="1">
@@ -4302,7 +4303,7 @@
       </p:transition>
     </mc:Fallback>
   </mc:AlternateContent>
-  <p:extLst mod="1">
+  <p:extLst>
     <p:ext uri="{DCECCB84-F9BA-43D5-87BE-67443E8EF086}">
       <p15:sldGuideLst xmlns:p15="http://schemas.microsoft.com/office/powerpoint/2012/main">
         <p15:guide id="2" orient="horz" pos="2496">
@@ -4526,7 +4527,7 @@
       </p:transition>
     </mc:Fallback>
   </mc:AlternateContent>
-  <p:extLst mod="1">
+  <p:extLst>
     <p:ext uri="{DCECCB84-F9BA-43D5-87BE-67443E8EF086}">
       <p15:sldGuideLst xmlns:p15="http://schemas.microsoft.com/office/powerpoint/2012/main">
         <p15:guide id="2" orient="horz" pos="2496">
@@ -4735,7 +4736,7 @@
       </p:transition>
     </mc:Fallback>
   </mc:AlternateContent>
-  <p:extLst mod="1">
+  <p:extLst>
     <p:ext uri="{DCECCB84-F9BA-43D5-87BE-67443E8EF086}">
       <p15:sldGuideLst xmlns:p15="http://schemas.microsoft.com/office/powerpoint/2012/main">
         <p15:guide id="1" orient="horz" pos="2228">
@@ -4934,7 +4935,7 @@
       </p:transition>
     </mc:Fallback>
   </mc:AlternateContent>
-  <p:extLst mod="1">
+  <p:extLst>
     <p:ext uri="{DCECCB84-F9BA-43D5-87BE-67443E8EF086}">
       <p15:sldGuideLst xmlns:p15="http://schemas.microsoft.com/office/powerpoint/2012/main">
         <p15:guide id="1" orient="horz" pos="2228">
@@ -5141,7 +5142,7 @@
       </p:transition>
     </mc:Fallback>
   </mc:AlternateContent>
-  <p:extLst mod="1">
+  <p:extLst>
     <p:ext uri="{DCECCB84-F9BA-43D5-87BE-67443E8EF086}">
       <p15:sldGuideLst xmlns:p15="http://schemas.microsoft.com/office/powerpoint/2012/main">
         <p15:guide id="1" orient="horz" pos="2228" userDrawn="1">
@@ -5309,7 +5310,7 @@
   <p:transition>
     <p:fade/>
   </p:transition>
-  <p:extLst mod="1">
+  <p:extLst>
     <p:ext uri="{DCECCB84-F9BA-43D5-87BE-67443E8EF086}">
       <p15:sldGuideLst xmlns:p15="http://schemas.microsoft.com/office/powerpoint/2012/main">
         <p15:guide id="1" orient="horz" pos="288">
@@ -5449,7 +5450,7 @@
   <p:transition>
     <p:fade/>
   </p:transition>
-  <p:extLst mod="1">
+  <p:extLst>
     <p:ext uri="{DCECCB84-F9BA-43D5-87BE-67443E8EF086}">
       <p15:sldGuideLst xmlns:p15="http://schemas.microsoft.com/office/powerpoint/2012/main">
         <p15:guide id="2" orient="horz" pos="1272">
@@ -5729,7 +5730,7 @@
   <p:transition>
     <p:fade/>
   </p:transition>
-  <p:extLst mod="1">
+  <p:extLst>
     <p:ext uri="{DCECCB84-F9BA-43D5-87BE-67443E8EF086}">
       <p15:sldGuideLst xmlns:p15="http://schemas.microsoft.com/office/powerpoint/2012/main">
         <p15:guide id="1" orient="horz" pos="288">
@@ -6009,7 +6010,7 @@
   <p:transition>
     <p:fade/>
   </p:transition>
-  <p:extLst mod="1">
+  <p:extLst>
     <p:ext uri="{DCECCB84-F9BA-43D5-87BE-67443E8EF086}">
       <p15:sldGuideLst xmlns:p15="http://schemas.microsoft.com/office/powerpoint/2012/main">
         <p15:guide id="1" orient="horz" pos="288">
@@ -6091,7 +6092,7 @@
   <p:transition>
     <p:fade/>
   </p:transition>
-  <p:extLst mod="1">
+  <p:extLst>
     <p:ext uri="{DCECCB84-F9BA-43D5-87BE-67443E8EF086}">
       <p15:sldGuideLst xmlns:p15="http://schemas.microsoft.com/office/powerpoint/2012/main">
         <p15:guide id="3" orient="horz" pos="900">
@@ -6173,7 +6174,7 @@
   <p:transition>
     <p:fade/>
   </p:transition>
-  <p:extLst mod="1">
+  <p:extLst>
     <p:ext uri="{DCECCB84-F9BA-43D5-87BE-67443E8EF086}">
       <p15:sldGuideLst xmlns:p15="http://schemas.microsoft.com/office/powerpoint/2012/main">
         <p15:guide id="6" pos="779">
@@ -6378,7 +6379,7 @@
   <p:transition>
     <p:fade/>
   </p:transition>
-  <p:extLst mod="1">
+  <p:extLst>
     <p:ext uri="{DCECCB84-F9BA-43D5-87BE-67443E8EF086}">
       <p15:sldGuideLst xmlns:p15="http://schemas.microsoft.com/office/powerpoint/2012/main">
         <p15:guide id="6" pos="779">
@@ -6718,7 +6719,7 @@
   <p:transition>
     <p:fade/>
   </p:transition>
-  <p:extLst mod="1">
+  <p:extLst>
     <p:ext uri="{DCECCB84-F9BA-43D5-87BE-67443E8EF086}">
       <p15:sldGuideLst xmlns:p15="http://schemas.microsoft.com/office/powerpoint/2012/main">
         <p15:guide id="2" pos="3359">
@@ -6901,7 +6902,7 @@
   <p:transition>
     <p:fade/>
   </p:transition>
-  <p:extLst mod="1">
+  <p:extLst>
     <p:ext uri="{DCECCB84-F9BA-43D5-87BE-67443E8EF086}">
       <p15:sldGuideLst xmlns:p15="http://schemas.microsoft.com/office/powerpoint/2012/main">
         <p15:guide id="2" pos="3359">
@@ -7069,7 +7070,7 @@
   <p:transition>
     <p:fade/>
   </p:transition>
-  <p:extLst mod="1">
+  <p:extLst>
     <p:ext uri="{DCECCB84-F9BA-43D5-87BE-67443E8EF086}">
       <p15:sldGuideLst xmlns:p15="http://schemas.microsoft.com/office/powerpoint/2012/main">
         <p15:guide id="2" pos="3360">
@@ -7263,7 +7264,7 @@
       </p:transition>
     </mc:Fallback>
   </mc:AlternateContent>
-  <p:extLst mod="1">
+  <p:extLst>
     <p:ext uri="{DCECCB84-F9BA-43D5-87BE-67443E8EF086}">
       <p15:sldGuideLst xmlns:p15="http://schemas.microsoft.com/office/powerpoint/2012/main">
         <p15:guide id="1" orient="horz" pos="2228">
@@ -7452,7 +7453,7 @@
       </p:transition>
     </mc:Fallback>
   </mc:AlternateContent>
-  <p:extLst mod="1">
+  <p:extLst>
     <p:ext uri="{DCECCB84-F9BA-43D5-87BE-67443E8EF086}">
       <p15:sldGuideLst xmlns:p15="http://schemas.microsoft.com/office/powerpoint/2012/main">
         <p15:guide id="1" orient="horz" pos="2160">
@@ -7636,7 +7637,7 @@
       </p:transition>
     </mc:Fallback>
   </mc:AlternateContent>
-  <p:extLst mod="1">
+  <p:extLst>
     <p:ext uri="{DCECCB84-F9BA-43D5-87BE-67443E8EF086}">
       <p15:sldGuideLst xmlns:p15="http://schemas.microsoft.com/office/powerpoint/2012/main">
         <p15:guide id="1" orient="horz" pos="2160">
@@ -7769,7 +7770,7 @@
       </p:transition>
     </mc:Fallback>
   </mc:AlternateContent>
-  <p:extLst mod="1">
+  <p:extLst>
     <p:ext uri="{DCECCB84-F9BA-43D5-87BE-67443E8EF086}">
       <p15:sldGuideLst xmlns:p15="http://schemas.microsoft.com/office/powerpoint/2012/main">
         <p15:guide id="1" orient="horz" pos="2160">
@@ -7897,7 +7898,7 @@
       </p:transition>
     </mc:Fallback>
   </mc:AlternateContent>
-  <p:extLst mod="1">
+  <p:extLst>
     <p:ext uri="{DCECCB84-F9BA-43D5-87BE-67443E8EF086}">
       <p15:sldGuideLst xmlns:p15="http://schemas.microsoft.com/office/powerpoint/2012/main">
         <p15:guide id="1" orient="horz" pos="2160">
@@ -8030,7 +8031,7 @@
       </p:transition>
     </mc:Fallback>
   </mc:AlternateContent>
-  <p:extLst mod="1">
+  <p:extLst>
     <p:ext uri="{DCECCB84-F9BA-43D5-87BE-67443E8EF086}">
       <p15:sldGuideLst xmlns:p15="http://schemas.microsoft.com/office/powerpoint/2012/main">
         <p15:guide id="1" orient="horz" pos="2160">
@@ -8158,7 +8159,7 @@
       </p:transition>
     </mc:Fallback>
   </mc:AlternateContent>
-  <p:extLst mod="1">
+  <p:extLst>
     <p:ext uri="{DCECCB84-F9BA-43D5-87BE-67443E8EF086}">
       <p15:sldGuideLst xmlns:p15="http://schemas.microsoft.com/office/powerpoint/2012/main">
         <p15:guide id="1" orient="horz" pos="2160">
@@ -8217,7 +8218,7 @@
   <p:transition>
     <p:fade/>
   </p:transition>
-  <p:extLst mod="1">
+  <p:extLst>
     <p:ext uri="{DCECCB84-F9BA-43D5-87BE-67443E8EF086}">
       <p15:sldGuideLst xmlns:p15="http://schemas.microsoft.com/office/powerpoint/2012/main">
         <p15:guide id="1" orient="horz" pos="1272">
@@ -8276,7 +8277,7 @@
   <p:transition>
     <p:fade/>
   </p:transition>
-  <p:extLst mod="1">
+  <p:extLst>
     <p:ext uri="{DCECCB84-F9BA-43D5-87BE-67443E8EF086}">
       <p15:sldGuideLst xmlns:p15="http://schemas.microsoft.com/office/powerpoint/2012/main">
         <p15:guide id="1" orient="horz" pos="904">
@@ -8515,7 +8516,7 @@
   <p:transition>
     <p:fade/>
   </p:transition>
-  <p:extLst mod="1">
+  <p:extLst>
     <p:ext uri="{DCECCB84-F9BA-43D5-87BE-67443E8EF086}">
       <p15:sldGuideLst xmlns:p15="http://schemas.microsoft.com/office/powerpoint/2012/main">
         <p15:guide id="1" orient="horz" pos="1272">
@@ -8833,7 +8834,7 @@
   <p:transition>
     <p:fade/>
   </p:transition>
-  <p:extLst mod="1">
+  <p:extLst>
     <p:ext uri="{DCECCB84-F9BA-43D5-87BE-67443E8EF086}">
       <p15:sldGuideLst xmlns:p15="http://schemas.microsoft.com/office/powerpoint/2012/main">
         <p15:guide id="1" orient="horz" pos="288" userDrawn="1">
@@ -9086,7 +9087,7 @@
   <p:transition>
     <p:fade/>
   </p:transition>
-  <p:extLst mod="1">
+  <p:extLst>
     <p:ext uri="{DCECCB84-F9BA-43D5-87BE-67443E8EF086}">
       <p15:sldGuideLst xmlns:p15="http://schemas.microsoft.com/office/powerpoint/2012/main">
         <p15:guide id="1" orient="horz" pos="904">
@@ -9253,7 +9254,7 @@
   <p:transition>
     <p:fade/>
   </p:transition>
-  <p:extLst mod="1">
+  <p:extLst>
     <p:ext uri="{DCECCB84-F9BA-43D5-87BE-67443E8EF086}">
       <p15:sldGuideLst xmlns:p15="http://schemas.microsoft.com/office/powerpoint/2012/main">
         <p15:guide id="2" orient="horz" pos="1272" userDrawn="1">
@@ -9598,7 +9599,7 @@
   <p:transition>
     <p:fade/>
   </p:transition>
-  <p:extLst mod="1">
+  <p:extLst>
     <p:ext uri="{DCECCB84-F9BA-43D5-87BE-67443E8EF086}">
       <p15:sldGuideLst xmlns:p15="http://schemas.microsoft.com/office/powerpoint/2012/main">
         <p15:guide id="1" orient="horz" pos="288" userDrawn="1">
@@ -9943,7 +9944,7 @@
   <p:transition>
     <p:fade/>
   </p:transition>
-  <p:extLst mod="1">
+  <p:extLst>
     <p:ext uri="{DCECCB84-F9BA-43D5-87BE-67443E8EF086}">
       <p15:sldGuideLst xmlns:p15="http://schemas.microsoft.com/office/powerpoint/2012/main">
         <p15:guide id="1" orient="horz" pos="288" userDrawn="1">
@@ -10026,7 +10027,7 @@
   <p:transition>
     <p:fade/>
   </p:transition>
-  <p:extLst mod="1">
+  <p:extLst>
     <p:ext uri="{DCECCB84-F9BA-43D5-87BE-67443E8EF086}">
       <p15:sldGuideLst xmlns:p15="http://schemas.microsoft.com/office/powerpoint/2012/main">
         <p15:guide id="3" orient="horz" pos="900" userDrawn="1">
@@ -12329,7 +12330,7 @@
       </a:lvl9pPr>
     </p:otherStyle>
   </p:txStyles>
-  <p:extLst mod="1">
+  <p:extLst>
     <p:ext uri="{27BBF7A9-308A-43DC-89C8-2F10F3537804}">
       <p15:sldGuideLst xmlns:p15="http://schemas.microsoft.com/office/powerpoint/2012/main">
         <p15:guide id="16" pos="368" userDrawn="1">
@@ -14624,7 +14625,7 @@
       </a:lvl9pPr>
     </p:otherStyle>
   </p:txStyles>
-  <p:extLst mod="1">
+  <p:extLst>
     <p:ext uri="{27BBF7A9-308A-43DC-89C8-2F10F3537804}">
       <p15:sldGuideLst xmlns:p15="http://schemas.microsoft.com/office/powerpoint/2012/main">
         <p15:guide id="16" pos="368">
@@ -16441,6 +16442,1808 @@
           <a:chExt cx="0" cy="0"/>
         </a:xfrm>
       </p:grpSpPr>
+      <p:grpSp>
+        <p:nvGrpSpPr>
+          <p:cNvPr id="21" name="グループ化 20">
+            <a:extLst>
+              <a:ext uri="{FF2B5EF4-FFF2-40B4-BE49-F238E27FC236}">
+                <a16:creationId xmlns:a16="http://schemas.microsoft.com/office/drawing/2014/main" id="{503FCDB1-49F6-8B45-AE71-C0CB277C1322}"/>
+              </a:ext>
+            </a:extLst>
+          </p:cNvPr>
+          <p:cNvGrpSpPr/>
+          <p:nvPr/>
+        </p:nvGrpSpPr>
+        <p:grpSpPr>
+          <a:xfrm>
+            <a:off x="6597143" y="2420331"/>
+            <a:ext cx="1504744" cy="1173212"/>
+            <a:chOff x="4224017" y="2365324"/>
+            <a:chExt cx="1504744" cy="1173212"/>
+          </a:xfrm>
+        </p:grpSpPr>
+        <p:pic>
+          <p:nvPicPr>
+            <p:cNvPr id="4" name="図 3">
+              <a:extLst>
+                <a:ext uri="{FF2B5EF4-FFF2-40B4-BE49-F238E27FC236}">
+                  <a16:creationId xmlns:a16="http://schemas.microsoft.com/office/drawing/2014/main" id="{40E8A2D4-A42A-774E-8035-685AB1BC1422}"/>
+                </a:ext>
+              </a:extLst>
+            </p:cNvPr>
+            <p:cNvPicPr>
+              <a:picLocks noChangeAspect="1"/>
+            </p:cNvPicPr>
+            <p:nvPr/>
+          </p:nvPicPr>
+          <p:blipFill>
+            <a:blip r:embed="rId2"/>
+            <a:stretch>
+              <a:fillRect/>
+            </a:stretch>
+          </p:blipFill>
+          <p:spPr>
+            <a:xfrm>
+              <a:off x="4596654" y="2365324"/>
+              <a:ext cx="759471" cy="759471"/>
+            </a:xfrm>
+            <a:prstGeom prst="rect">
+              <a:avLst/>
+            </a:prstGeom>
+          </p:spPr>
+        </p:pic>
+        <p:sp>
+          <p:nvSpPr>
+            <p:cNvPr id="14" name="テキスト ボックス 13">
+              <a:extLst>
+                <a:ext uri="{FF2B5EF4-FFF2-40B4-BE49-F238E27FC236}">
+                  <a16:creationId xmlns:a16="http://schemas.microsoft.com/office/drawing/2014/main" id="{DF7A4EBA-62D8-4642-BAC8-1A67AFEA09B7}"/>
+                </a:ext>
+              </a:extLst>
+            </p:cNvPr>
+            <p:cNvSpPr txBox="1"/>
+            <p:nvPr/>
+          </p:nvSpPr>
+          <p:spPr>
+            <a:xfrm>
+              <a:off x="4224017" y="3027280"/>
+              <a:ext cx="1504744" cy="511256"/>
+            </a:xfrm>
+            <a:prstGeom prst="rect">
+              <a:avLst/>
+            </a:prstGeom>
+            <a:noFill/>
+          </p:spPr>
+          <p:txBody>
+            <a:bodyPr wrap="square" lIns="179285" tIns="143428" rIns="179285" bIns="143428" rtlCol="0">
+              <a:spAutoFit/>
+            </a:bodyPr>
+            <a:lstStyle/>
+            <a:p>
+              <a:pPr algn="ctr">
+                <a:lnSpc>
+                  <a:spcPct val="90000"/>
+                </a:lnSpc>
+                <a:spcAft>
+                  <a:spcPts val="588"/>
+                </a:spcAft>
+              </a:pPr>
+              <a:r>
+                <a:rPr kumimoji="1" lang="en-US" altLang="ja-JP" sz="1600" dirty="0">
+                  <a:gradFill>
+                    <a:gsLst>
+                      <a:gs pos="2917">
+                        <a:schemeClr val="tx1"/>
+                      </a:gs>
+                      <a:gs pos="30000">
+                        <a:schemeClr val="tx1"/>
+                      </a:gs>
+                    </a:gsLst>
+                    <a:lin ang="5400000" scaled="0"/>
+                  </a:gradFill>
+                  <a:latin typeface="Meiryo UI" panose="020B0604030504040204" pitchFamily="34" charset="-128"/>
+                  <a:ea typeface="Meiryo UI" panose="020B0604030504040204" pitchFamily="34" charset="-128"/>
+                </a:rPr>
+                <a:t>IoT Hub</a:t>
+              </a:r>
+              <a:endParaRPr kumimoji="1" lang="ja-JP" altLang="en-US" sz="1600" dirty="0">
+                <a:gradFill>
+                  <a:gsLst>
+                    <a:gs pos="2917">
+                      <a:schemeClr val="tx1"/>
+                    </a:gs>
+                    <a:gs pos="30000">
+                      <a:schemeClr val="tx1"/>
+                    </a:gs>
+                  </a:gsLst>
+                  <a:lin ang="5400000" scaled="0"/>
+                </a:gradFill>
+                <a:latin typeface="Meiryo UI" panose="020B0604030504040204" pitchFamily="34" charset="-128"/>
+                <a:ea typeface="Meiryo UI" panose="020B0604030504040204" pitchFamily="34" charset="-128"/>
+              </a:endParaRPr>
+            </a:p>
+          </p:txBody>
+        </p:sp>
+      </p:grpSp>
+      <p:grpSp>
+        <p:nvGrpSpPr>
+          <p:cNvPr id="22" name="グループ化 21">
+            <a:extLst>
+              <a:ext uri="{FF2B5EF4-FFF2-40B4-BE49-F238E27FC236}">
+                <a16:creationId xmlns:a16="http://schemas.microsoft.com/office/drawing/2014/main" id="{EFE3CA81-1AFF-0B4A-8995-E94C3F8FC4AC}"/>
+              </a:ext>
+            </a:extLst>
+          </p:cNvPr>
+          <p:cNvGrpSpPr/>
+          <p:nvPr/>
+        </p:nvGrpSpPr>
+        <p:grpSpPr>
+          <a:xfrm>
+            <a:off x="8828945" y="4632944"/>
+            <a:ext cx="1504744" cy="1310075"/>
+            <a:chOff x="6759624" y="1166049"/>
+            <a:chExt cx="1504744" cy="1310075"/>
+          </a:xfrm>
+        </p:grpSpPr>
+        <p:pic>
+          <p:nvPicPr>
+            <p:cNvPr id="6" name="グラフィックス 5">
+              <a:extLst>
+                <a:ext uri="{FF2B5EF4-FFF2-40B4-BE49-F238E27FC236}">
+                  <a16:creationId xmlns:a16="http://schemas.microsoft.com/office/drawing/2014/main" id="{2B9907B9-AB0E-9D46-A102-524FB6ACBFB4}"/>
+                </a:ext>
+              </a:extLst>
+            </p:cNvPr>
+            <p:cNvPicPr>
+              <a:picLocks noChangeAspect="1"/>
+            </p:cNvPicPr>
+            <p:nvPr/>
+          </p:nvPicPr>
+          <p:blipFill>
+            <a:blip r:embed="rId3">
+              <a:extLst>
+                <a:ext uri="{96DAC541-7B7A-43D3-8B79-37D633B846F1}">
+                  <asvg:svgBlip xmlns:asvg="http://schemas.microsoft.com/office/drawing/2016/SVG/main" r:embed="rId4"/>
+                </a:ext>
+              </a:extLst>
+            </a:blip>
+            <a:stretch>
+              <a:fillRect/>
+            </a:stretch>
+          </p:blipFill>
+          <p:spPr>
+            <a:xfrm>
+              <a:off x="7159073" y="1166049"/>
+              <a:ext cx="705846" cy="705846"/>
+            </a:xfrm>
+            <a:prstGeom prst="rect">
+              <a:avLst/>
+            </a:prstGeom>
+          </p:spPr>
+        </p:pic>
+        <p:sp>
+          <p:nvSpPr>
+            <p:cNvPr id="16" name="テキスト ボックス 15">
+              <a:extLst>
+                <a:ext uri="{FF2B5EF4-FFF2-40B4-BE49-F238E27FC236}">
+                  <a16:creationId xmlns:a16="http://schemas.microsoft.com/office/drawing/2014/main" id="{B8CC1E0E-53A7-8840-985B-D2CD8FBD4326}"/>
+                </a:ext>
+              </a:extLst>
+            </p:cNvPr>
+            <p:cNvSpPr txBox="1"/>
+            <p:nvPr/>
+          </p:nvSpPr>
+          <p:spPr>
+            <a:xfrm>
+              <a:off x="6759624" y="1743268"/>
+              <a:ext cx="1504744" cy="732856"/>
+            </a:xfrm>
+            <a:prstGeom prst="rect">
+              <a:avLst/>
+            </a:prstGeom>
+            <a:noFill/>
+          </p:spPr>
+          <p:txBody>
+            <a:bodyPr wrap="square" lIns="179285" tIns="143428" rIns="179285" bIns="143428" rtlCol="0">
+              <a:spAutoFit/>
+            </a:bodyPr>
+            <a:lstStyle/>
+            <a:p>
+              <a:pPr algn="ctr">
+                <a:lnSpc>
+                  <a:spcPct val="90000"/>
+                </a:lnSpc>
+                <a:spcAft>
+                  <a:spcPts val="588"/>
+                </a:spcAft>
+              </a:pPr>
+              <a:r>
+                <a:rPr kumimoji="1" lang="en-US" altLang="ja-JP" sz="1600" dirty="0">
+                  <a:gradFill>
+                    <a:gsLst>
+                      <a:gs pos="2917">
+                        <a:schemeClr val="tx1"/>
+                      </a:gs>
+                      <a:gs pos="30000">
+                        <a:schemeClr val="tx1"/>
+                      </a:gs>
+                    </a:gsLst>
+                    <a:lin ang="5400000" scaled="0"/>
+                  </a:gradFill>
+                  <a:latin typeface="Meiryo UI" panose="020B0604030504040204" pitchFamily="34" charset="-128"/>
+                  <a:ea typeface="Meiryo UI" panose="020B0604030504040204" pitchFamily="34" charset="-128"/>
+                </a:rPr>
+                <a:t>Timeseries</a:t>
+              </a:r>
+              <a:br>
+                <a:rPr kumimoji="1" lang="en-US" altLang="ja-JP" sz="1600" dirty="0">
+                  <a:gradFill>
+                    <a:gsLst>
+                      <a:gs pos="2917">
+                        <a:schemeClr val="tx1"/>
+                      </a:gs>
+                      <a:gs pos="30000">
+                        <a:schemeClr val="tx1"/>
+                      </a:gs>
+                    </a:gsLst>
+                    <a:lin ang="5400000" scaled="0"/>
+                  </a:gradFill>
+                  <a:latin typeface="Meiryo UI" panose="020B0604030504040204" pitchFamily="34" charset="-128"/>
+                  <a:ea typeface="Meiryo UI" panose="020B0604030504040204" pitchFamily="34" charset="-128"/>
+                </a:rPr>
+              </a:br>
+              <a:r>
+                <a:rPr kumimoji="1" lang="en-US" altLang="ja-JP" sz="1600" dirty="0">
+                  <a:gradFill>
+                    <a:gsLst>
+                      <a:gs pos="2917">
+                        <a:schemeClr val="tx1"/>
+                      </a:gs>
+                      <a:gs pos="30000">
+                        <a:schemeClr val="tx1"/>
+                      </a:gs>
+                    </a:gsLst>
+                    <a:lin ang="5400000" scaled="0"/>
+                  </a:gradFill>
+                  <a:latin typeface="Meiryo UI" panose="020B0604030504040204" pitchFamily="34" charset="-128"/>
+                  <a:ea typeface="Meiryo UI" panose="020B0604030504040204" pitchFamily="34" charset="-128"/>
+                </a:rPr>
+                <a:t>Insights</a:t>
+              </a:r>
+              <a:endParaRPr kumimoji="1" lang="ja-JP" altLang="en-US" sz="1600" dirty="0">
+                <a:gradFill>
+                  <a:gsLst>
+                    <a:gs pos="2917">
+                      <a:schemeClr val="tx1"/>
+                    </a:gs>
+                    <a:gs pos="30000">
+                      <a:schemeClr val="tx1"/>
+                    </a:gs>
+                  </a:gsLst>
+                  <a:lin ang="5400000" scaled="0"/>
+                </a:gradFill>
+                <a:latin typeface="Meiryo UI" panose="020B0604030504040204" pitchFamily="34" charset="-128"/>
+                <a:ea typeface="Meiryo UI" panose="020B0604030504040204" pitchFamily="34" charset="-128"/>
+              </a:endParaRPr>
+            </a:p>
+          </p:txBody>
+        </p:sp>
+      </p:grpSp>
+      <p:cxnSp>
+        <p:nvCxnSpPr>
+          <p:cNvPr id="28" name="直線矢印コネクタ 27">
+            <a:extLst>
+              <a:ext uri="{FF2B5EF4-FFF2-40B4-BE49-F238E27FC236}">
+                <a16:creationId xmlns:a16="http://schemas.microsoft.com/office/drawing/2014/main" id="{B92EEDDA-EA12-DE4D-BF91-F61BD22564BE}"/>
+              </a:ext>
+            </a:extLst>
+          </p:cNvPr>
+          <p:cNvCxnSpPr>
+            <a:cxnSpLocks/>
+            <a:stCxn id="67" idx="3"/>
+            <a:endCxn id="4" idx="1"/>
+          </p:cNvCxnSpPr>
+          <p:nvPr/>
+        </p:nvCxnSpPr>
+        <p:spPr>
+          <a:xfrm flipV="1">
+            <a:off x="5138275" y="2800067"/>
+            <a:ext cx="1831505" cy="2080135"/>
+          </a:xfrm>
+          <a:prstGeom prst="straightConnector1">
+            <a:avLst/>
+          </a:prstGeom>
+          <a:ln>
+            <a:solidFill>
+              <a:schemeClr val="tx1"/>
+            </a:solidFill>
+            <a:headEnd type="none" w="lg" len="med"/>
+            <a:tailEnd type="triangle"/>
+          </a:ln>
+        </p:spPr>
+        <p:style>
+          <a:lnRef idx="1">
+            <a:schemeClr val="accent1"/>
+          </a:lnRef>
+          <a:fillRef idx="0">
+            <a:schemeClr val="accent1"/>
+          </a:fillRef>
+          <a:effectRef idx="0">
+            <a:schemeClr val="accent1"/>
+          </a:effectRef>
+          <a:fontRef idx="minor">
+            <a:schemeClr val="tx1"/>
+          </a:fontRef>
+        </p:style>
+      </p:cxnSp>
+      <p:cxnSp>
+        <p:nvCxnSpPr>
+          <p:cNvPr id="41" name="直線矢印コネクタ 37">
+            <a:extLst>
+              <a:ext uri="{FF2B5EF4-FFF2-40B4-BE49-F238E27FC236}">
+                <a16:creationId xmlns:a16="http://schemas.microsoft.com/office/drawing/2014/main" id="{5B4031C1-23C4-8B42-91C5-8162BF7E148F}"/>
+              </a:ext>
+            </a:extLst>
+          </p:cNvPr>
+          <p:cNvCxnSpPr>
+            <a:cxnSpLocks/>
+            <a:stCxn id="4" idx="3"/>
+            <a:endCxn id="6" idx="1"/>
+          </p:cNvCxnSpPr>
+          <p:nvPr/>
+        </p:nvCxnSpPr>
+        <p:spPr>
+          <a:xfrm>
+            <a:off x="7729251" y="2800067"/>
+            <a:ext cx="1499143" cy="2185800"/>
+          </a:xfrm>
+          <a:prstGeom prst="bentConnector3">
+            <a:avLst>
+              <a:gd name="adj1" fmla="val 50000"/>
+            </a:avLst>
+          </a:prstGeom>
+          <a:ln>
+            <a:solidFill>
+              <a:schemeClr val="tx1"/>
+            </a:solidFill>
+            <a:headEnd type="none" w="lg" len="med"/>
+            <a:tailEnd type="triangle"/>
+          </a:ln>
+        </p:spPr>
+        <p:style>
+          <a:lnRef idx="1">
+            <a:schemeClr val="accent1"/>
+          </a:lnRef>
+          <a:fillRef idx="0">
+            <a:schemeClr val="accent1"/>
+          </a:fillRef>
+          <a:effectRef idx="0">
+            <a:schemeClr val="accent1"/>
+          </a:effectRef>
+          <a:fontRef idx="minor">
+            <a:schemeClr val="tx1"/>
+          </a:fontRef>
+        </p:style>
+      </p:cxnSp>
+      <p:pic>
+        <p:nvPicPr>
+          <p:cNvPr id="45" name="図 44">
+            <a:extLst>
+              <a:ext uri="{FF2B5EF4-FFF2-40B4-BE49-F238E27FC236}">
+                <a16:creationId xmlns:a16="http://schemas.microsoft.com/office/drawing/2014/main" id="{1DB380B7-93C4-2247-B282-07D23DA28E68}"/>
+              </a:ext>
+            </a:extLst>
+          </p:cNvPr>
+          <p:cNvPicPr>
+            <a:picLocks noChangeAspect="1"/>
+          </p:cNvPicPr>
+          <p:nvPr/>
+        </p:nvPicPr>
+        <p:blipFill>
+          <a:blip r:embed="rId5"/>
+          <a:stretch>
+            <a:fillRect/>
+          </a:stretch>
+        </p:blipFill>
+        <p:spPr>
+          <a:xfrm>
+            <a:off x="869962" y="3695495"/>
+            <a:ext cx="705847" cy="705847"/>
+          </a:xfrm>
+          <a:prstGeom prst="rect">
+            <a:avLst/>
+          </a:prstGeom>
+        </p:spPr>
+      </p:pic>
+      <p:pic>
+        <p:nvPicPr>
+          <p:cNvPr id="46" name="図 45">
+            <a:extLst>
+              <a:ext uri="{FF2B5EF4-FFF2-40B4-BE49-F238E27FC236}">
+                <a16:creationId xmlns:a16="http://schemas.microsoft.com/office/drawing/2014/main" id="{26A87941-6342-F44C-B75C-05D99AA2270C}"/>
+              </a:ext>
+            </a:extLst>
+          </p:cNvPr>
+          <p:cNvPicPr>
+            <a:picLocks noChangeAspect="1"/>
+          </p:cNvPicPr>
+          <p:nvPr/>
+        </p:nvPicPr>
+        <p:blipFill>
+          <a:blip r:embed="rId5"/>
+          <a:stretch>
+            <a:fillRect/>
+          </a:stretch>
+        </p:blipFill>
+        <p:spPr>
+          <a:xfrm>
+            <a:off x="627636" y="4340840"/>
+            <a:ext cx="705847" cy="705847"/>
+          </a:xfrm>
+          <a:prstGeom prst="rect">
+            <a:avLst/>
+          </a:prstGeom>
+        </p:spPr>
+      </p:pic>
+      <p:pic>
+        <p:nvPicPr>
+          <p:cNvPr id="47" name="図 46">
+            <a:extLst>
+              <a:ext uri="{FF2B5EF4-FFF2-40B4-BE49-F238E27FC236}">
+                <a16:creationId xmlns:a16="http://schemas.microsoft.com/office/drawing/2014/main" id="{BBD7947B-C066-7A48-9D73-0DA3A3E951A7}"/>
+              </a:ext>
+            </a:extLst>
+          </p:cNvPr>
+          <p:cNvPicPr>
+            <a:picLocks noChangeAspect="1"/>
+          </p:cNvPicPr>
+          <p:nvPr/>
+        </p:nvPicPr>
+        <p:blipFill>
+          <a:blip r:embed="rId5"/>
+          <a:stretch>
+            <a:fillRect/>
+          </a:stretch>
+        </p:blipFill>
+        <p:spPr>
+          <a:xfrm>
+            <a:off x="355772" y="4986184"/>
+            <a:ext cx="705847" cy="705847"/>
+          </a:xfrm>
+          <a:prstGeom prst="rect">
+            <a:avLst/>
+          </a:prstGeom>
+        </p:spPr>
+      </p:pic>
+      <p:cxnSp>
+        <p:nvCxnSpPr>
+          <p:cNvPr id="48" name="直線矢印コネクタ 47">
+            <a:extLst>
+              <a:ext uri="{FF2B5EF4-FFF2-40B4-BE49-F238E27FC236}">
+                <a16:creationId xmlns:a16="http://schemas.microsoft.com/office/drawing/2014/main" id="{D8A4E8AA-1C95-2746-BC1C-94AEA9ABE95F}"/>
+              </a:ext>
+            </a:extLst>
+          </p:cNvPr>
+          <p:cNvCxnSpPr>
+            <a:cxnSpLocks/>
+            <a:stCxn id="45" idx="3"/>
+            <a:endCxn id="31" idx="1"/>
+          </p:cNvCxnSpPr>
+          <p:nvPr/>
+        </p:nvCxnSpPr>
+        <p:spPr>
+          <a:xfrm>
+            <a:off x="1575809" y="4048419"/>
+            <a:ext cx="1178206" cy="577765"/>
+          </a:xfrm>
+          <a:prstGeom prst="straightConnector1">
+            <a:avLst/>
+          </a:prstGeom>
+          <a:ln>
+            <a:solidFill>
+              <a:schemeClr val="tx1"/>
+            </a:solidFill>
+            <a:headEnd type="none" w="lg" len="med"/>
+            <a:tailEnd type="triangle"/>
+          </a:ln>
+        </p:spPr>
+        <p:style>
+          <a:lnRef idx="1">
+            <a:schemeClr val="accent1"/>
+          </a:lnRef>
+          <a:fillRef idx="0">
+            <a:schemeClr val="accent1"/>
+          </a:fillRef>
+          <a:effectRef idx="0">
+            <a:schemeClr val="accent1"/>
+          </a:effectRef>
+          <a:fontRef idx="minor">
+            <a:schemeClr val="tx1"/>
+          </a:fontRef>
+        </p:style>
+      </p:cxnSp>
+      <p:cxnSp>
+        <p:nvCxnSpPr>
+          <p:cNvPr id="51" name="直線矢印コネクタ 50">
+            <a:extLst>
+              <a:ext uri="{FF2B5EF4-FFF2-40B4-BE49-F238E27FC236}">
+                <a16:creationId xmlns:a16="http://schemas.microsoft.com/office/drawing/2014/main" id="{1876CB36-845E-AA40-84E2-52E826C528DF}"/>
+              </a:ext>
+            </a:extLst>
+          </p:cNvPr>
+          <p:cNvCxnSpPr>
+            <a:cxnSpLocks/>
+            <a:stCxn id="46" idx="3"/>
+            <a:endCxn id="31" idx="1"/>
+          </p:cNvCxnSpPr>
+          <p:nvPr/>
+        </p:nvCxnSpPr>
+        <p:spPr>
+          <a:xfrm flipV="1">
+            <a:off x="1333483" y="4626184"/>
+            <a:ext cx="1420532" cy="67580"/>
+          </a:xfrm>
+          <a:prstGeom prst="straightConnector1">
+            <a:avLst/>
+          </a:prstGeom>
+          <a:ln>
+            <a:solidFill>
+              <a:schemeClr val="tx1"/>
+            </a:solidFill>
+            <a:headEnd type="none" w="lg" len="med"/>
+            <a:tailEnd type="triangle"/>
+          </a:ln>
+        </p:spPr>
+        <p:style>
+          <a:lnRef idx="1">
+            <a:schemeClr val="accent1"/>
+          </a:lnRef>
+          <a:fillRef idx="0">
+            <a:schemeClr val="accent1"/>
+          </a:fillRef>
+          <a:effectRef idx="0">
+            <a:schemeClr val="accent1"/>
+          </a:effectRef>
+          <a:fontRef idx="minor">
+            <a:schemeClr val="tx1"/>
+          </a:fontRef>
+        </p:style>
+      </p:cxnSp>
+      <p:cxnSp>
+        <p:nvCxnSpPr>
+          <p:cNvPr id="54" name="直線矢印コネクタ 53">
+            <a:extLst>
+              <a:ext uri="{FF2B5EF4-FFF2-40B4-BE49-F238E27FC236}">
+                <a16:creationId xmlns:a16="http://schemas.microsoft.com/office/drawing/2014/main" id="{099A41C7-DD51-9641-B1A0-470BD223C8FF}"/>
+              </a:ext>
+            </a:extLst>
+          </p:cNvPr>
+          <p:cNvCxnSpPr>
+            <a:cxnSpLocks/>
+            <a:stCxn id="47" idx="3"/>
+            <a:endCxn id="31" idx="1"/>
+          </p:cNvCxnSpPr>
+          <p:nvPr/>
+        </p:nvCxnSpPr>
+        <p:spPr>
+          <a:xfrm flipV="1">
+            <a:off x="1061619" y="4626184"/>
+            <a:ext cx="1692396" cy="712924"/>
+          </a:xfrm>
+          <a:prstGeom prst="straightConnector1">
+            <a:avLst/>
+          </a:prstGeom>
+          <a:ln>
+            <a:solidFill>
+              <a:schemeClr val="tx1"/>
+            </a:solidFill>
+            <a:headEnd type="none" w="lg" len="med"/>
+            <a:tailEnd type="triangle"/>
+          </a:ln>
+        </p:spPr>
+        <p:style>
+          <a:lnRef idx="1">
+            <a:schemeClr val="accent1"/>
+          </a:lnRef>
+          <a:fillRef idx="0">
+            <a:schemeClr val="accent1"/>
+          </a:fillRef>
+          <a:effectRef idx="0">
+            <a:schemeClr val="accent1"/>
+          </a:effectRef>
+          <a:fontRef idx="minor">
+            <a:schemeClr val="tx1"/>
+          </a:fontRef>
+        </p:style>
+      </p:cxnSp>
+      <p:grpSp>
+        <p:nvGrpSpPr>
+          <p:cNvPr id="57" name="グループ化 56">
+            <a:extLst>
+              <a:ext uri="{FF2B5EF4-FFF2-40B4-BE49-F238E27FC236}">
+                <a16:creationId xmlns:a16="http://schemas.microsoft.com/office/drawing/2014/main" id="{9E35B6D2-0357-904C-A265-324397B0659B}"/>
+              </a:ext>
+            </a:extLst>
+          </p:cNvPr>
+          <p:cNvGrpSpPr/>
+          <p:nvPr/>
+        </p:nvGrpSpPr>
+        <p:grpSpPr>
+          <a:xfrm>
+            <a:off x="3373960" y="1145679"/>
+            <a:ext cx="1504744" cy="1763820"/>
+            <a:chOff x="958588" y="2398036"/>
+            <a:chExt cx="1504744" cy="1763820"/>
+          </a:xfrm>
+        </p:grpSpPr>
+        <p:pic>
+          <p:nvPicPr>
+            <p:cNvPr id="58" name="図 57">
+              <a:extLst>
+                <a:ext uri="{FF2B5EF4-FFF2-40B4-BE49-F238E27FC236}">
+                  <a16:creationId xmlns:a16="http://schemas.microsoft.com/office/drawing/2014/main" id="{B2419187-A5BC-E643-90C3-4E047B2DE2F8}"/>
+                </a:ext>
+              </a:extLst>
+            </p:cNvPr>
+            <p:cNvPicPr>
+              <a:picLocks noChangeAspect="1"/>
+            </p:cNvPicPr>
+            <p:nvPr/>
+          </p:nvPicPr>
+          <p:blipFill>
+            <a:blip r:embed="rId6"/>
+            <a:stretch>
+              <a:fillRect/>
+            </a:stretch>
+          </p:blipFill>
+          <p:spPr>
+            <a:xfrm>
+              <a:off x="1131151" y="2398036"/>
+              <a:ext cx="1159618" cy="1331993"/>
+            </a:xfrm>
+            <a:prstGeom prst="rect">
+              <a:avLst/>
+            </a:prstGeom>
+          </p:spPr>
+        </p:pic>
+        <p:sp>
+          <p:nvSpPr>
+            <p:cNvPr id="59" name="テキスト ボックス 58">
+              <a:extLst>
+                <a:ext uri="{FF2B5EF4-FFF2-40B4-BE49-F238E27FC236}">
+                  <a16:creationId xmlns:a16="http://schemas.microsoft.com/office/drawing/2014/main" id="{3A859A5E-FE28-0741-B5AD-9E3909ADC003}"/>
+                </a:ext>
+              </a:extLst>
+            </p:cNvPr>
+            <p:cNvSpPr txBox="1"/>
+            <p:nvPr/>
+          </p:nvSpPr>
+          <p:spPr>
+            <a:xfrm>
+              <a:off x="958588" y="3429000"/>
+              <a:ext cx="1504744" cy="732856"/>
+            </a:xfrm>
+            <a:prstGeom prst="rect">
+              <a:avLst/>
+            </a:prstGeom>
+            <a:noFill/>
+          </p:spPr>
+          <p:txBody>
+            <a:bodyPr wrap="square" lIns="179285" tIns="143428" rIns="179285" bIns="143428" rtlCol="0">
+              <a:spAutoFit/>
+            </a:bodyPr>
+            <a:lstStyle/>
+            <a:p>
+              <a:pPr algn="ctr">
+                <a:lnSpc>
+                  <a:spcPct val="90000"/>
+                </a:lnSpc>
+                <a:spcAft>
+                  <a:spcPts val="588"/>
+                </a:spcAft>
+              </a:pPr>
+              <a:r>
+                <a:rPr kumimoji="1" lang="en-US" altLang="ja-JP" sz="1600" dirty="0">
+                  <a:gradFill>
+                    <a:gsLst>
+                      <a:gs pos="2917">
+                        <a:schemeClr val="tx1"/>
+                      </a:gs>
+                      <a:gs pos="30000">
+                        <a:schemeClr val="tx1"/>
+                      </a:gs>
+                    </a:gsLst>
+                    <a:lin ang="5400000" scaled="0"/>
+                  </a:gradFill>
+                  <a:latin typeface="Meiryo UI" panose="020B0604030504040204" pitchFamily="34" charset="-128"/>
+                  <a:ea typeface="Meiryo UI" panose="020B0604030504040204" pitchFamily="34" charset="-128"/>
+                </a:rPr>
+                <a:t>IoT Hub</a:t>
+              </a:r>
+              <a:br>
+                <a:rPr kumimoji="1" lang="en-US" altLang="ja-JP" sz="1600" dirty="0">
+                  <a:gradFill>
+                    <a:gsLst>
+                      <a:gs pos="2917">
+                        <a:schemeClr val="tx1"/>
+                      </a:gs>
+                      <a:gs pos="30000">
+                        <a:schemeClr val="tx1"/>
+                      </a:gs>
+                    </a:gsLst>
+                    <a:lin ang="5400000" scaled="0"/>
+                  </a:gradFill>
+                  <a:latin typeface="Meiryo UI" panose="020B0604030504040204" pitchFamily="34" charset="-128"/>
+                  <a:ea typeface="Meiryo UI" panose="020B0604030504040204" pitchFamily="34" charset="-128"/>
+                </a:rPr>
+              </a:br>
+              <a:r>
+                <a:rPr kumimoji="1" lang="en-US" altLang="ja-JP" sz="1600" dirty="0">
+                  <a:gradFill>
+                    <a:gsLst>
+                      <a:gs pos="2917">
+                        <a:schemeClr val="tx1"/>
+                      </a:gs>
+                      <a:gs pos="30000">
+                        <a:schemeClr val="tx1"/>
+                      </a:gs>
+                    </a:gsLst>
+                    <a:lin ang="5400000" scaled="0"/>
+                  </a:gradFill>
+                  <a:latin typeface="Meiryo UI" panose="020B0604030504040204" pitchFamily="34" charset="-128"/>
+                  <a:ea typeface="Meiryo UI" panose="020B0604030504040204" pitchFamily="34" charset="-128"/>
+                </a:rPr>
+                <a:t>SDK</a:t>
+              </a:r>
+              <a:endParaRPr kumimoji="1" lang="ja-JP" altLang="en-US" sz="1600" dirty="0">
+                <a:gradFill>
+                  <a:gsLst>
+                    <a:gs pos="2917">
+                      <a:schemeClr val="tx1"/>
+                    </a:gs>
+                    <a:gs pos="30000">
+                      <a:schemeClr val="tx1"/>
+                    </a:gs>
+                  </a:gsLst>
+                  <a:lin ang="5400000" scaled="0"/>
+                </a:gradFill>
+                <a:latin typeface="Meiryo UI" panose="020B0604030504040204" pitchFamily="34" charset="-128"/>
+                <a:ea typeface="Meiryo UI" panose="020B0604030504040204" pitchFamily="34" charset="-128"/>
+              </a:endParaRPr>
+            </a:p>
+          </p:txBody>
+        </p:sp>
+      </p:grpSp>
+      <p:grpSp>
+        <p:nvGrpSpPr>
+          <p:cNvPr id="61" name="グループ化 60">
+            <a:extLst>
+              <a:ext uri="{FF2B5EF4-FFF2-40B4-BE49-F238E27FC236}">
+                <a16:creationId xmlns:a16="http://schemas.microsoft.com/office/drawing/2014/main" id="{8EBE440B-F272-764D-83D2-500D5D97847C}"/>
+              </a:ext>
+            </a:extLst>
+          </p:cNvPr>
+          <p:cNvGrpSpPr/>
+          <p:nvPr/>
+        </p:nvGrpSpPr>
+        <p:grpSpPr>
+          <a:xfrm>
+            <a:off x="2347575" y="4273261"/>
+            <a:ext cx="1504744" cy="1196004"/>
+            <a:chOff x="2496918" y="2881016"/>
+            <a:chExt cx="1504744" cy="1196004"/>
+          </a:xfrm>
+        </p:grpSpPr>
+        <p:pic>
+          <p:nvPicPr>
+            <p:cNvPr id="31" name="グラフィックス 30">
+              <a:extLst>
+                <a:ext uri="{FF2B5EF4-FFF2-40B4-BE49-F238E27FC236}">
+                  <a16:creationId xmlns:a16="http://schemas.microsoft.com/office/drawing/2014/main" id="{5DE44B85-1193-204B-AA05-961967BB6650}"/>
+                </a:ext>
+              </a:extLst>
+            </p:cNvPr>
+            <p:cNvPicPr>
+              <a:picLocks noChangeAspect="1"/>
+            </p:cNvPicPr>
+            <p:nvPr/>
+          </p:nvPicPr>
+          <p:blipFill>
+            <a:blip r:embed="rId7">
+              <a:extLst>
+                <a:ext uri="{96DAC541-7B7A-43D3-8B79-37D633B846F1}">
+                  <asvg:svgBlip xmlns:asvg="http://schemas.microsoft.com/office/drawing/2016/SVG/main" r:embed="rId8"/>
+                </a:ext>
+              </a:extLst>
+            </a:blip>
+            <a:stretch>
+              <a:fillRect/>
+            </a:stretch>
+          </p:blipFill>
+          <p:spPr>
+            <a:xfrm>
+              <a:off x="2903358" y="2881016"/>
+              <a:ext cx="705846" cy="705846"/>
+            </a:xfrm>
+            <a:prstGeom prst="rect">
+              <a:avLst/>
+            </a:prstGeom>
+          </p:spPr>
+        </p:pic>
+        <p:sp>
+          <p:nvSpPr>
+            <p:cNvPr id="60" name="テキスト ボックス 59">
+              <a:extLst>
+                <a:ext uri="{FF2B5EF4-FFF2-40B4-BE49-F238E27FC236}">
+                  <a16:creationId xmlns:a16="http://schemas.microsoft.com/office/drawing/2014/main" id="{EB12C24C-E82E-A94F-A06B-5E422D281341}"/>
+                </a:ext>
+              </a:extLst>
+            </p:cNvPr>
+            <p:cNvSpPr txBox="1"/>
+            <p:nvPr/>
+          </p:nvSpPr>
+          <p:spPr>
+            <a:xfrm>
+              <a:off x="2496918" y="3565764"/>
+              <a:ext cx="1504744" cy="511256"/>
+            </a:xfrm>
+            <a:prstGeom prst="rect">
+              <a:avLst/>
+            </a:prstGeom>
+            <a:noFill/>
+          </p:spPr>
+          <p:txBody>
+            <a:bodyPr wrap="square" lIns="179285" tIns="143428" rIns="179285" bIns="143428" rtlCol="0">
+              <a:spAutoFit/>
+            </a:bodyPr>
+            <a:lstStyle/>
+            <a:p>
+              <a:pPr algn="ctr">
+                <a:lnSpc>
+                  <a:spcPct val="90000"/>
+                </a:lnSpc>
+                <a:spcAft>
+                  <a:spcPts val="588"/>
+                </a:spcAft>
+              </a:pPr>
+              <a:r>
+                <a:rPr kumimoji="1" lang="en-US" altLang="ja-JP" sz="1600" dirty="0">
+                  <a:gradFill>
+                    <a:gsLst>
+                      <a:gs pos="2917">
+                        <a:schemeClr val="tx1"/>
+                      </a:gs>
+                      <a:gs pos="30000">
+                        <a:schemeClr val="tx1"/>
+                      </a:gs>
+                    </a:gsLst>
+                    <a:lin ang="5400000" scaled="0"/>
+                  </a:gradFill>
+                  <a:latin typeface="Meiryo UI" panose="020B0604030504040204" pitchFamily="34" charset="-128"/>
+                  <a:ea typeface="Meiryo UI" panose="020B0604030504040204" pitchFamily="34" charset="-128"/>
+                </a:rPr>
+                <a:t>IoT Edge</a:t>
+              </a:r>
+              <a:endParaRPr kumimoji="1" lang="ja-JP" altLang="en-US" sz="1600" dirty="0">
+                <a:gradFill>
+                  <a:gsLst>
+                    <a:gs pos="2917">
+                      <a:schemeClr val="tx1"/>
+                    </a:gs>
+                    <a:gs pos="30000">
+                      <a:schemeClr val="tx1"/>
+                    </a:gs>
+                  </a:gsLst>
+                  <a:lin ang="5400000" scaled="0"/>
+                </a:gradFill>
+                <a:latin typeface="Meiryo UI" panose="020B0604030504040204" pitchFamily="34" charset="-128"/>
+                <a:ea typeface="Meiryo UI" panose="020B0604030504040204" pitchFamily="34" charset="-128"/>
+              </a:endParaRPr>
+            </a:p>
+          </p:txBody>
+        </p:sp>
+      </p:grpSp>
+      <p:cxnSp>
+        <p:nvCxnSpPr>
+          <p:cNvPr id="62" name="直線矢印コネクタ 61">
+            <a:extLst>
+              <a:ext uri="{FF2B5EF4-FFF2-40B4-BE49-F238E27FC236}">
+                <a16:creationId xmlns:a16="http://schemas.microsoft.com/office/drawing/2014/main" id="{541451E9-87C6-FD4B-9C76-FBC2A925F5E8}"/>
+              </a:ext>
+            </a:extLst>
+          </p:cNvPr>
+          <p:cNvCxnSpPr>
+            <a:cxnSpLocks/>
+            <a:stCxn id="58" idx="3"/>
+            <a:endCxn id="4" idx="1"/>
+          </p:cNvCxnSpPr>
+          <p:nvPr/>
+        </p:nvCxnSpPr>
+        <p:spPr>
+          <a:xfrm>
+            <a:off x="4706141" y="1811676"/>
+            <a:ext cx="2263639" cy="988391"/>
+          </a:xfrm>
+          <a:prstGeom prst="straightConnector1">
+            <a:avLst/>
+          </a:prstGeom>
+          <a:ln>
+            <a:solidFill>
+              <a:schemeClr val="tx1"/>
+            </a:solidFill>
+            <a:headEnd type="none" w="lg" len="med"/>
+            <a:tailEnd type="triangle"/>
+          </a:ln>
+        </p:spPr>
+        <p:style>
+          <a:lnRef idx="1">
+            <a:schemeClr val="accent1"/>
+          </a:lnRef>
+          <a:fillRef idx="0">
+            <a:schemeClr val="accent1"/>
+          </a:fillRef>
+          <a:effectRef idx="0">
+            <a:schemeClr val="accent1"/>
+          </a:effectRef>
+          <a:fontRef idx="minor">
+            <a:schemeClr val="tx1"/>
+          </a:fontRef>
+        </p:style>
+      </p:cxnSp>
+      <p:sp>
+        <p:nvSpPr>
+          <p:cNvPr id="67" name="角丸四角形 66">
+            <a:extLst>
+              <a:ext uri="{FF2B5EF4-FFF2-40B4-BE49-F238E27FC236}">
+                <a16:creationId xmlns:a16="http://schemas.microsoft.com/office/drawing/2014/main" id="{E8C78B41-AAFF-7C48-AF8A-1A34F053EBA7}"/>
+              </a:ext>
+            </a:extLst>
+          </p:cNvPr>
+          <p:cNvSpPr/>
+          <p:nvPr/>
+        </p:nvSpPr>
+        <p:spPr bwMode="auto">
+          <a:xfrm>
+            <a:off x="2534478" y="4144118"/>
+            <a:ext cx="2603797" cy="1472168"/>
+          </a:xfrm>
+          <a:prstGeom prst="roundRect">
+            <a:avLst>
+              <a:gd name="adj" fmla="val 7056"/>
+            </a:avLst>
+          </a:prstGeom>
+          <a:noFill/>
+          <a:ln>
+            <a:solidFill>
+              <a:srgbClr val="0078D4"/>
+            </a:solidFill>
+            <a:headEnd type="none" w="med" len="med"/>
+            <a:tailEnd type="none" w="med" len="med"/>
+          </a:ln>
+          <a:effectLst/>
+        </p:spPr>
+        <p:style>
+          <a:lnRef idx="1">
+            <a:schemeClr val="accent2"/>
+          </a:lnRef>
+          <a:fillRef idx="3">
+            <a:schemeClr val="accent2"/>
+          </a:fillRef>
+          <a:effectRef idx="2">
+            <a:schemeClr val="accent2"/>
+          </a:effectRef>
+          <a:fontRef idx="minor">
+            <a:schemeClr val="lt1"/>
+          </a:fontRef>
+        </p:style>
+        <p:txBody>
+          <a:bodyPr rot="0" spcFirstLastPara="0" vertOverflow="overflow" horzOverflow="overflow" vert="horz" wrap="square" lIns="182880" tIns="146304" rIns="182880" bIns="146304" numCol="1" spcCol="0" rtlCol="0" fromWordArt="0" anchor="t" anchorCtr="0" forceAA="0" compatLnSpc="1">
+            <a:prstTxWarp prst="textNoShape">
+              <a:avLst/>
+            </a:prstTxWarp>
+            <a:noAutofit/>
+          </a:bodyPr>
+          <a:lstStyle/>
+          <a:p>
+            <a:pPr algn="l" defTabSz="932472" fontAlgn="base">
+              <a:spcBef>
+                <a:spcPct val="0"/>
+              </a:spcBef>
+              <a:spcAft>
+                <a:spcPct val="0"/>
+              </a:spcAft>
+            </a:pPr>
+            <a:endParaRPr kumimoji="1" lang="ja-JP" altLang="en-US" sz="2000" dirty="0" err="1">
+              <a:gradFill>
+                <a:gsLst>
+                  <a:gs pos="0">
+                    <a:srgbClr val="FFFFFF"/>
+                  </a:gs>
+                  <a:gs pos="100000">
+                    <a:srgbClr val="FFFFFF"/>
+                  </a:gs>
+                </a:gsLst>
+                <a:lin ang="5400000" scaled="0"/>
+              </a:gradFill>
+              <a:ea typeface="Segoe UI" pitchFamily="34" charset="0"/>
+              <a:cs typeface="Segoe UI" pitchFamily="34" charset="0"/>
+            </a:endParaRPr>
+          </a:p>
+        </p:txBody>
+      </p:sp>
+      <p:grpSp>
+        <p:nvGrpSpPr>
+          <p:cNvPr id="78" name="グループ化 77">
+            <a:extLst>
+              <a:ext uri="{FF2B5EF4-FFF2-40B4-BE49-F238E27FC236}">
+                <a16:creationId xmlns:a16="http://schemas.microsoft.com/office/drawing/2014/main" id="{CA599B6A-8E9C-3D4E-8CBC-F6D6352DD11F}"/>
+              </a:ext>
+            </a:extLst>
+          </p:cNvPr>
+          <p:cNvGrpSpPr/>
+          <p:nvPr/>
+        </p:nvGrpSpPr>
+        <p:grpSpPr>
+          <a:xfrm>
+            <a:off x="4039222" y="4986184"/>
+            <a:ext cx="744787" cy="511256"/>
+            <a:chOff x="5022802" y="4767032"/>
+            <a:chExt cx="744787" cy="511256"/>
+          </a:xfrm>
+        </p:grpSpPr>
+        <p:sp>
+          <p:nvSpPr>
+            <p:cNvPr id="72" name="直方体 71">
+              <a:extLst>
+                <a:ext uri="{FF2B5EF4-FFF2-40B4-BE49-F238E27FC236}">
+                  <a16:creationId xmlns:a16="http://schemas.microsoft.com/office/drawing/2014/main" id="{40277A0B-32B6-9648-A56B-5096C51D02A2}"/>
+                </a:ext>
+              </a:extLst>
+            </p:cNvPr>
+            <p:cNvSpPr/>
+            <p:nvPr/>
+          </p:nvSpPr>
+          <p:spPr bwMode="auto">
+            <a:xfrm>
+              <a:off x="5022802" y="4767032"/>
+              <a:ext cx="744787" cy="511256"/>
+            </a:xfrm>
+            <a:prstGeom prst="cube">
+              <a:avLst/>
+            </a:prstGeom>
+            <a:solidFill>
+              <a:schemeClr val="bg1"/>
+            </a:solidFill>
+            <a:ln>
+              <a:solidFill>
+                <a:schemeClr val="bg1">
+                  <a:lumMod val="50000"/>
+                </a:schemeClr>
+              </a:solidFill>
+              <a:headEnd type="none" w="med" len="med"/>
+              <a:tailEnd type="none" w="med" len="med"/>
+            </a:ln>
+            <a:effectLst/>
+          </p:spPr>
+          <p:style>
+            <a:lnRef idx="1">
+              <a:schemeClr val="accent2"/>
+            </a:lnRef>
+            <a:fillRef idx="3">
+              <a:schemeClr val="accent2"/>
+            </a:fillRef>
+            <a:effectRef idx="2">
+              <a:schemeClr val="accent2"/>
+            </a:effectRef>
+            <a:fontRef idx="minor">
+              <a:schemeClr val="lt1"/>
+            </a:fontRef>
+          </p:style>
+          <p:txBody>
+            <a:bodyPr rot="0" spcFirstLastPara="0" vertOverflow="overflow" horzOverflow="overflow" vert="horz" wrap="square" lIns="182880" tIns="146304" rIns="182880" bIns="146304" numCol="1" spcCol="0" rtlCol="0" fromWordArt="0" anchor="t" anchorCtr="0" forceAA="0" compatLnSpc="1">
+              <a:prstTxWarp prst="textNoShape">
+                <a:avLst/>
+              </a:prstTxWarp>
+              <a:noAutofit/>
+            </a:bodyPr>
+            <a:lstStyle/>
+            <a:p>
+              <a:pPr algn="l" defTabSz="932472" fontAlgn="base">
+                <a:spcBef>
+                  <a:spcPct val="0"/>
+                </a:spcBef>
+                <a:spcAft>
+                  <a:spcPct val="0"/>
+                </a:spcAft>
+              </a:pPr>
+              <a:endParaRPr kumimoji="1" lang="ja-JP" altLang="en-US" sz="2000" dirty="0" err="1">
+                <a:gradFill>
+                  <a:gsLst>
+                    <a:gs pos="0">
+                      <a:srgbClr val="FFFFFF"/>
+                    </a:gs>
+                    <a:gs pos="100000">
+                      <a:srgbClr val="FFFFFF"/>
+                    </a:gs>
+                  </a:gsLst>
+                  <a:lin ang="5400000" scaled="0"/>
+                </a:gradFill>
+                <a:ea typeface="Segoe UI" pitchFamily="34" charset="0"/>
+                <a:cs typeface="Segoe UI" pitchFamily="34" charset="0"/>
+              </a:endParaRPr>
+            </a:p>
+          </p:txBody>
+        </p:sp>
+        <p:pic>
+          <p:nvPicPr>
+            <p:cNvPr id="71" name="グラフィックス 70">
+              <a:extLst>
+                <a:ext uri="{FF2B5EF4-FFF2-40B4-BE49-F238E27FC236}">
+                  <a16:creationId xmlns:a16="http://schemas.microsoft.com/office/drawing/2014/main" id="{DC174B04-4F1F-DD45-97A9-7E2013ED83AC}"/>
+                </a:ext>
+              </a:extLst>
+            </p:cNvPr>
+            <p:cNvPicPr>
+              <a:picLocks noChangeAspect="1"/>
+            </p:cNvPicPr>
+            <p:nvPr/>
+          </p:nvPicPr>
+          <p:blipFill>
+            <a:blip r:embed="rId9">
+              <a:extLst>
+                <a:ext uri="{96DAC541-7B7A-43D3-8B79-37D633B846F1}">
+                  <asvg:svgBlip xmlns:asvg="http://schemas.microsoft.com/office/drawing/2016/SVG/main" r:embed="rId10"/>
+                </a:ext>
+              </a:extLst>
+            </a:blip>
+            <a:stretch>
+              <a:fillRect/>
+            </a:stretch>
+          </p:blipFill>
+          <p:spPr>
+            <a:xfrm>
+              <a:off x="5159334" y="4897189"/>
+              <a:ext cx="381099" cy="381099"/>
+            </a:xfrm>
+            <a:prstGeom prst="rect">
+              <a:avLst/>
+            </a:prstGeom>
+          </p:spPr>
+        </p:pic>
+      </p:grpSp>
+      <p:grpSp>
+        <p:nvGrpSpPr>
+          <p:cNvPr id="80" name="グループ化 79">
+            <a:extLst>
+              <a:ext uri="{FF2B5EF4-FFF2-40B4-BE49-F238E27FC236}">
+                <a16:creationId xmlns:a16="http://schemas.microsoft.com/office/drawing/2014/main" id="{24B49A42-25D1-D74B-95AD-28A53E85A2C6}"/>
+              </a:ext>
+            </a:extLst>
+          </p:cNvPr>
+          <p:cNvGrpSpPr/>
+          <p:nvPr/>
+        </p:nvGrpSpPr>
+        <p:grpSpPr>
+          <a:xfrm>
+            <a:off x="8861358" y="2444918"/>
+            <a:ext cx="1504744" cy="1489536"/>
+            <a:chOff x="6759624" y="2806379"/>
+            <a:chExt cx="1504744" cy="1489536"/>
+          </a:xfrm>
+        </p:grpSpPr>
+        <p:pic>
+          <p:nvPicPr>
+            <p:cNvPr id="81" name="グラフィックス 80">
+              <a:extLst>
+                <a:ext uri="{FF2B5EF4-FFF2-40B4-BE49-F238E27FC236}">
+                  <a16:creationId xmlns:a16="http://schemas.microsoft.com/office/drawing/2014/main" id="{7788C9A7-0BAF-3646-81A3-581D3A5931B3}"/>
+                </a:ext>
+              </a:extLst>
+            </p:cNvPr>
+            <p:cNvPicPr>
+              <a:picLocks noChangeAspect="1"/>
+            </p:cNvPicPr>
+            <p:nvPr/>
+          </p:nvPicPr>
+          <p:blipFill>
+            <a:blip r:embed="rId9">
+              <a:extLst>
+                <a:ext uri="{96DAC541-7B7A-43D3-8B79-37D633B846F1}">
+                  <asvg:svgBlip xmlns:asvg="http://schemas.microsoft.com/office/drawing/2016/SVG/main" r:embed="rId10"/>
+                </a:ext>
+              </a:extLst>
+            </a:blip>
+            <a:stretch>
+              <a:fillRect/>
+            </a:stretch>
+          </p:blipFill>
+          <p:spPr>
+            <a:xfrm>
+              <a:off x="7159073" y="2806379"/>
+              <a:ext cx="705846" cy="705846"/>
+            </a:xfrm>
+            <a:prstGeom prst="rect">
+              <a:avLst/>
+            </a:prstGeom>
+          </p:spPr>
+        </p:pic>
+        <p:sp>
+          <p:nvSpPr>
+            <p:cNvPr id="82" name="テキスト ボックス 81">
+              <a:extLst>
+                <a:ext uri="{FF2B5EF4-FFF2-40B4-BE49-F238E27FC236}">
+                  <a16:creationId xmlns:a16="http://schemas.microsoft.com/office/drawing/2014/main" id="{7580FE12-6624-3744-8A4A-8E28D3419B54}"/>
+                </a:ext>
+              </a:extLst>
+            </p:cNvPr>
+            <p:cNvSpPr txBox="1"/>
+            <p:nvPr/>
+          </p:nvSpPr>
+          <p:spPr>
+            <a:xfrm>
+              <a:off x="6759624" y="3341460"/>
+              <a:ext cx="1504744" cy="954455"/>
+            </a:xfrm>
+            <a:prstGeom prst="rect">
+              <a:avLst/>
+            </a:prstGeom>
+            <a:noFill/>
+          </p:spPr>
+          <p:txBody>
+            <a:bodyPr wrap="square" lIns="179285" tIns="143428" rIns="179285" bIns="143428" rtlCol="0">
+              <a:spAutoFit/>
+            </a:bodyPr>
+            <a:lstStyle/>
+            <a:p>
+              <a:pPr algn="ctr">
+                <a:lnSpc>
+                  <a:spcPct val="90000"/>
+                </a:lnSpc>
+                <a:spcAft>
+                  <a:spcPts val="588"/>
+                </a:spcAft>
+              </a:pPr>
+              <a:r>
+                <a:rPr kumimoji="1" lang="en-US" altLang="ja-JP" sz="1600" dirty="0">
+                  <a:gradFill>
+                    <a:gsLst>
+                      <a:gs pos="2917">
+                        <a:schemeClr val="tx1"/>
+                      </a:gs>
+                      <a:gs pos="30000">
+                        <a:schemeClr val="tx1"/>
+                      </a:gs>
+                    </a:gsLst>
+                    <a:lin ang="5400000" scaled="0"/>
+                  </a:gradFill>
+                  <a:latin typeface="Meiryo UI" panose="020B0604030504040204" pitchFamily="34" charset="-128"/>
+                  <a:ea typeface="Meiryo UI" panose="020B0604030504040204" pitchFamily="34" charset="-128"/>
+                </a:rPr>
+                <a:t>Azure</a:t>
+              </a:r>
+              <a:br>
+                <a:rPr kumimoji="1" lang="en-US" altLang="ja-JP" sz="1600" dirty="0">
+                  <a:gradFill>
+                    <a:gsLst>
+                      <a:gs pos="2917">
+                        <a:schemeClr val="tx1"/>
+                      </a:gs>
+                      <a:gs pos="30000">
+                        <a:schemeClr val="tx1"/>
+                      </a:gs>
+                    </a:gsLst>
+                    <a:lin ang="5400000" scaled="0"/>
+                  </a:gradFill>
+                  <a:latin typeface="Meiryo UI" panose="020B0604030504040204" pitchFamily="34" charset="-128"/>
+                  <a:ea typeface="Meiryo UI" panose="020B0604030504040204" pitchFamily="34" charset="-128"/>
+                </a:rPr>
+              </a:br>
+              <a:r>
+                <a:rPr kumimoji="1" lang="en-US" altLang="ja-JP" sz="1600" dirty="0">
+                  <a:gradFill>
+                    <a:gsLst>
+                      <a:gs pos="2917">
+                        <a:schemeClr val="tx1"/>
+                      </a:gs>
+                      <a:gs pos="30000">
+                        <a:schemeClr val="tx1"/>
+                      </a:gs>
+                    </a:gsLst>
+                    <a:lin ang="5400000" scaled="0"/>
+                  </a:gradFill>
+                  <a:latin typeface="Meiryo UI" panose="020B0604030504040204" pitchFamily="34" charset="-128"/>
+                  <a:ea typeface="Meiryo UI" panose="020B0604030504040204" pitchFamily="34" charset="-128"/>
+                </a:rPr>
+                <a:t>Stream</a:t>
+              </a:r>
+              <a:br>
+                <a:rPr kumimoji="1" lang="en-US" altLang="ja-JP" sz="1600" dirty="0">
+                  <a:gradFill>
+                    <a:gsLst>
+                      <a:gs pos="2917">
+                        <a:schemeClr val="tx1"/>
+                      </a:gs>
+                      <a:gs pos="30000">
+                        <a:schemeClr val="tx1"/>
+                      </a:gs>
+                    </a:gsLst>
+                    <a:lin ang="5400000" scaled="0"/>
+                  </a:gradFill>
+                  <a:latin typeface="Meiryo UI" panose="020B0604030504040204" pitchFamily="34" charset="-128"/>
+                  <a:ea typeface="Meiryo UI" panose="020B0604030504040204" pitchFamily="34" charset="-128"/>
+                </a:rPr>
+              </a:br>
+              <a:r>
+                <a:rPr kumimoji="1" lang="en-US" altLang="ja-JP" sz="1600" dirty="0">
+                  <a:gradFill>
+                    <a:gsLst>
+                      <a:gs pos="2917">
+                        <a:schemeClr val="tx1"/>
+                      </a:gs>
+                      <a:gs pos="30000">
+                        <a:schemeClr val="tx1"/>
+                      </a:gs>
+                    </a:gsLst>
+                    <a:lin ang="5400000" scaled="0"/>
+                  </a:gradFill>
+                  <a:latin typeface="Meiryo UI" panose="020B0604030504040204" pitchFamily="34" charset="-128"/>
+                  <a:ea typeface="Meiryo UI" panose="020B0604030504040204" pitchFamily="34" charset="-128"/>
+                </a:rPr>
+                <a:t>Analytics</a:t>
+              </a:r>
+              <a:endParaRPr kumimoji="1" lang="ja-JP" altLang="en-US" sz="1600" dirty="0">
+                <a:gradFill>
+                  <a:gsLst>
+                    <a:gs pos="2917">
+                      <a:schemeClr val="tx1"/>
+                    </a:gs>
+                    <a:gs pos="30000">
+                      <a:schemeClr val="tx1"/>
+                    </a:gs>
+                  </a:gsLst>
+                  <a:lin ang="5400000" scaled="0"/>
+                </a:gradFill>
+                <a:latin typeface="Meiryo UI" panose="020B0604030504040204" pitchFamily="34" charset="-128"/>
+                <a:ea typeface="Meiryo UI" panose="020B0604030504040204" pitchFamily="34" charset="-128"/>
+              </a:endParaRPr>
+            </a:p>
+          </p:txBody>
+        </p:sp>
+      </p:grpSp>
+      <p:cxnSp>
+        <p:nvCxnSpPr>
+          <p:cNvPr id="83" name="直線矢印コネクタ 37">
+            <a:extLst>
+              <a:ext uri="{FF2B5EF4-FFF2-40B4-BE49-F238E27FC236}">
+                <a16:creationId xmlns:a16="http://schemas.microsoft.com/office/drawing/2014/main" id="{2919A04A-5DF8-824C-979D-D30815366551}"/>
+              </a:ext>
+            </a:extLst>
+          </p:cNvPr>
+          <p:cNvCxnSpPr>
+            <a:cxnSpLocks/>
+            <a:stCxn id="4" idx="3"/>
+            <a:endCxn id="81" idx="1"/>
+          </p:cNvCxnSpPr>
+          <p:nvPr/>
+        </p:nvCxnSpPr>
+        <p:spPr>
+          <a:xfrm flipV="1">
+            <a:off x="7729251" y="2797841"/>
+            <a:ext cx="1531556" cy="2226"/>
+          </a:xfrm>
+          <a:prstGeom prst="straightConnector1">
+            <a:avLst/>
+          </a:prstGeom>
+          <a:ln>
+            <a:solidFill>
+              <a:schemeClr val="tx1"/>
+            </a:solidFill>
+            <a:headEnd type="none" w="lg" len="med"/>
+            <a:tailEnd type="triangle"/>
+          </a:ln>
+        </p:spPr>
+        <p:style>
+          <a:lnRef idx="1">
+            <a:schemeClr val="accent1"/>
+          </a:lnRef>
+          <a:fillRef idx="0">
+            <a:schemeClr val="accent1"/>
+          </a:fillRef>
+          <a:effectRef idx="0">
+            <a:schemeClr val="accent1"/>
+          </a:effectRef>
+          <a:fontRef idx="minor">
+            <a:schemeClr val="tx1"/>
+          </a:fontRef>
+        </p:style>
+      </p:cxnSp>
+      <p:grpSp>
+        <p:nvGrpSpPr>
+          <p:cNvPr id="88" name="グループ化 87">
+            <a:extLst>
+              <a:ext uri="{FF2B5EF4-FFF2-40B4-BE49-F238E27FC236}">
+                <a16:creationId xmlns:a16="http://schemas.microsoft.com/office/drawing/2014/main" id="{CAF05F40-3AC8-B14E-BE73-80B3367AD413}"/>
+              </a:ext>
+            </a:extLst>
+          </p:cNvPr>
+          <p:cNvGrpSpPr/>
+          <p:nvPr/>
+        </p:nvGrpSpPr>
+        <p:grpSpPr>
+          <a:xfrm>
+            <a:off x="10474815" y="4590506"/>
+            <a:ext cx="1504744" cy="1368007"/>
+            <a:chOff x="8558067" y="4132271"/>
+            <a:chExt cx="1504744" cy="1368007"/>
+          </a:xfrm>
+        </p:grpSpPr>
+        <p:pic>
+          <p:nvPicPr>
+            <p:cNvPr id="89" name="グラフィックス 88">
+              <a:extLst>
+                <a:ext uri="{FF2B5EF4-FFF2-40B4-BE49-F238E27FC236}">
+                  <a16:creationId xmlns:a16="http://schemas.microsoft.com/office/drawing/2014/main" id="{521BB278-FD93-BB4C-A50F-D3429A35FC8D}"/>
+                </a:ext>
+              </a:extLst>
+            </p:cNvPr>
+            <p:cNvPicPr>
+              <a:picLocks noChangeAspect="1"/>
+            </p:cNvPicPr>
+            <p:nvPr/>
+          </p:nvPicPr>
+          <p:blipFill>
+            <a:blip r:embed="rId11">
+              <a:extLst>
+                <a:ext uri="{96DAC541-7B7A-43D3-8B79-37D633B846F1}">
+                  <asvg:svgBlip xmlns:asvg="http://schemas.microsoft.com/office/drawing/2016/SVG/main" r:embed="rId12"/>
+                </a:ext>
+              </a:extLst>
+            </a:blip>
+            <a:stretch>
+              <a:fillRect/>
+            </a:stretch>
+          </p:blipFill>
+          <p:spPr>
+            <a:xfrm>
+              <a:off x="8921121" y="4132271"/>
+              <a:ext cx="778636" cy="778636"/>
+            </a:xfrm>
+            <a:prstGeom prst="rect">
+              <a:avLst/>
+            </a:prstGeom>
+          </p:spPr>
+        </p:pic>
+        <p:sp>
+          <p:nvSpPr>
+            <p:cNvPr id="90" name="テキスト ボックス 89">
+              <a:extLst>
+                <a:ext uri="{FF2B5EF4-FFF2-40B4-BE49-F238E27FC236}">
+                  <a16:creationId xmlns:a16="http://schemas.microsoft.com/office/drawing/2014/main" id="{A7C3BDE8-A9DE-084A-B5AC-A53FB6977522}"/>
+                </a:ext>
+              </a:extLst>
+            </p:cNvPr>
+            <p:cNvSpPr txBox="1"/>
+            <p:nvPr/>
+          </p:nvSpPr>
+          <p:spPr>
+            <a:xfrm>
+              <a:off x="8558067" y="4767422"/>
+              <a:ext cx="1504744" cy="732856"/>
+            </a:xfrm>
+            <a:prstGeom prst="rect">
+              <a:avLst/>
+            </a:prstGeom>
+            <a:noFill/>
+          </p:spPr>
+          <p:txBody>
+            <a:bodyPr wrap="square" lIns="179285" tIns="143428" rIns="179285" bIns="143428" rtlCol="0">
+              <a:spAutoFit/>
+            </a:bodyPr>
+            <a:lstStyle/>
+            <a:p>
+              <a:pPr algn="ctr">
+                <a:lnSpc>
+                  <a:spcPct val="90000"/>
+                </a:lnSpc>
+                <a:spcAft>
+                  <a:spcPts val="588"/>
+                </a:spcAft>
+              </a:pPr>
+              <a:r>
+                <a:rPr kumimoji="1" lang="en-US" altLang="ja-JP" sz="1600" dirty="0">
+                  <a:gradFill>
+                    <a:gsLst>
+                      <a:gs pos="2917">
+                        <a:schemeClr val="tx1"/>
+                      </a:gs>
+                      <a:gs pos="30000">
+                        <a:schemeClr val="tx1"/>
+                      </a:gs>
+                    </a:gsLst>
+                    <a:lin ang="5400000" scaled="0"/>
+                  </a:gradFill>
+                  <a:latin typeface="Meiryo UI" panose="020B0604030504040204" pitchFamily="34" charset="-128"/>
+                  <a:ea typeface="Meiryo UI" panose="020B0604030504040204" pitchFamily="34" charset="-128"/>
+                </a:rPr>
+                <a:t>Blob</a:t>
+              </a:r>
+              <a:br>
+                <a:rPr kumimoji="1" lang="en-US" altLang="ja-JP" sz="1600" dirty="0">
+                  <a:gradFill>
+                    <a:gsLst>
+                      <a:gs pos="2917">
+                        <a:schemeClr val="tx1"/>
+                      </a:gs>
+                      <a:gs pos="30000">
+                        <a:schemeClr val="tx1"/>
+                      </a:gs>
+                    </a:gsLst>
+                    <a:lin ang="5400000" scaled="0"/>
+                  </a:gradFill>
+                  <a:latin typeface="Meiryo UI" panose="020B0604030504040204" pitchFamily="34" charset="-128"/>
+                  <a:ea typeface="Meiryo UI" panose="020B0604030504040204" pitchFamily="34" charset="-128"/>
+                </a:rPr>
+              </a:br>
+              <a:r>
+                <a:rPr kumimoji="1" lang="en-US" altLang="ja-JP" sz="1600" dirty="0">
+                  <a:gradFill>
+                    <a:gsLst>
+                      <a:gs pos="2917">
+                        <a:schemeClr val="tx1"/>
+                      </a:gs>
+                      <a:gs pos="30000">
+                        <a:schemeClr val="tx1"/>
+                      </a:gs>
+                    </a:gsLst>
+                    <a:lin ang="5400000" scaled="0"/>
+                  </a:gradFill>
+                  <a:latin typeface="Meiryo UI" panose="020B0604030504040204" pitchFamily="34" charset="-128"/>
+                  <a:ea typeface="Meiryo UI" panose="020B0604030504040204" pitchFamily="34" charset="-128"/>
+                </a:rPr>
+                <a:t>Storage</a:t>
+              </a:r>
+              <a:endParaRPr kumimoji="1" lang="ja-JP" altLang="en-US" sz="1600" dirty="0">
+                <a:gradFill>
+                  <a:gsLst>
+                    <a:gs pos="2917">
+                      <a:schemeClr val="tx1"/>
+                    </a:gs>
+                    <a:gs pos="30000">
+                      <a:schemeClr val="tx1"/>
+                    </a:gs>
+                  </a:gsLst>
+                  <a:lin ang="5400000" scaled="0"/>
+                </a:gradFill>
+                <a:latin typeface="Meiryo UI" panose="020B0604030504040204" pitchFamily="34" charset="-128"/>
+                <a:ea typeface="Meiryo UI" panose="020B0604030504040204" pitchFamily="34" charset="-128"/>
+              </a:endParaRPr>
+            </a:p>
+          </p:txBody>
+        </p:sp>
+      </p:grpSp>
+      <p:cxnSp>
+        <p:nvCxnSpPr>
+          <p:cNvPr id="91" name="直線矢印コネクタ 37">
+            <a:extLst>
+              <a:ext uri="{FF2B5EF4-FFF2-40B4-BE49-F238E27FC236}">
+                <a16:creationId xmlns:a16="http://schemas.microsoft.com/office/drawing/2014/main" id="{AB8A8C9E-AA89-0643-BF83-B9D4697D55E1}"/>
+              </a:ext>
+            </a:extLst>
+          </p:cNvPr>
+          <p:cNvCxnSpPr>
+            <a:cxnSpLocks/>
+            <a:stCxn id="81" idx="3"/>
+            <a:endCxn id="89" idx="1"/>
+          </p:cNvCxnSpPr>
+          <p:nvPr/>
+        </p:nvCxnSpPr>
+        <p:spPr>
+          <a:xfrm>
+            <a:off x="9966653" y="2797841"/>
+            <a:ext cx="871216" cy="2181983"/>
+          </a:xfrm>
+          <a:prstGeom prst="bentConnector3">
+            <a:avLst>
+              <a:gd name="adj1" fmla="val 50000"/>
+            </a:avLst>
+          </a:prstGeom>
+          <a:ln>
+            <a:solidFill>
+              <a:schemeClr val="tx1"/>
+            </a:solidFill>
+            <a:headEnd type="none" w="lg" len="med"/>
+            <a:tailEnd type="triangle"/>
+          </a:ln>
+        </p:spPr>
+        <p:style>
+          <a:lnRef idx="1">
+            <a:schemeClr val="accent1"/>
+          </a:lnRef>
+          <a:fillRef idx="0">
+            <a:schemeClr val="accent1"/>
+          </a:fillRef>
+          <a:effectRef idx="0">
+            <a:schemeClr val="accent1"/>
+          </a:effectRef>
+          <a:fontRef idx="minor">
+            <a:schemeClr val="tx1"/>
+          </a:fontRef>
+        </p:style>
+      </p:cxnSp>
+      <p:sp>
+        <p:nvSpPr>
+          <p:cNvPr id="94" name="テキスト ボックス 93">
+            <a:extLst>
+              <a:ext uri="{FF2B5EF4-FFF2-40B4-BE49-F238E27FC236}">
+                <a16:creationId xmlns:a16="http://schemas.microsoft.com/office/drawing/2014/main" id="{71841981-AF44-0D45-B93C-9110712CF0FD}"/>
+              </a:ext>
+            </a:extLst>
+          </p:cNvPr>
+          <p:cNvSpPr txBox="1"/>
+          <p:nvPr/>
+        </p:nvSpPr>
+        <p:spPr>
+          <a:xfrm>
+            <a:off x="5355468" y="4753589"/>
+            <a:ext cx="1580561" cy="615553"/>
+          </a:xfrm>
+          <a:prstGeom prst="rect">
+            <a:avLst/>
+          </a:prstGeom>
+          <a:noFill/>
+        </p:spPr>
+        <p:txBody>
+          <a:bodyPr wrap="none" lIns="0" tIns="0" rIns="0" bIns="0" rtlCol="0">
+            <a:spAutoFit/>
+          </a:bodyPr>
+          <a:lstStyle/>
+          <a:p>
+            <a:pPr algn="l"/>
+            <a:r>
+              <a:rPr kumimoji="1" lang="ja-JP" altLang="en-US" sz="2000">
+                <a:gradFill>
+                  <a:gsLst>
+                    <a:gs pos="2917">
+                      <a:schemeClr val="tx1"/>
+                    </a:gs>
+                    <a:gs pos="30000">
+                      <a:schemeClr val="tx1"/>
+                    </a:gs>
+                  </a:gsLst>
+                  <a:lin ang="5400000" scaled="0"/>
+                </a:gradFill>
+              </a:rPr>
+              <a:t>異常値のみ</a:t>
+            </a:r>
+            <a:endParaRPr kumimoji="1" lang="en-US" altLang="ja-JP" sz="2000" dirty="0">
+              <a:gradFill>
+                <a:gsLst>
+                  <a:gs pos="2917">
+                    <a:schemeClr val="tx1"/>
+                  </a:gs>
+                  <a:gs pos="30000">
+                    <a:schemeClr val="tx1"/>
+                  </a:gs>
+                </a:gsLst>
+                <a:lin ang="5400000" scaled="0"/>
+              </a:gradFill>
+            </a:endParaRPr>
+          </a:p>
+          <a:p>
+            <a:pPr algn="l"/>
+            <a:r>
+              <a:rPr kumimoji="1" lang="en-US" altLang="ja-JP" sz="2000" dirty="0">
+                <a:gradFill>
+                  <a:gsLst>
+                    <a:gs pos="2917">
+                      <a:schemeClr val="tx1"/>
+                    </a:gs>
+                    <a:gs pos="30000">
+                      <a:schemeClr val="tx1"/>
+                    </a:gs>
+                  </a:gsLst>
+                  <a:lin ang="5400000" scaled="0"/>
+                </a:gradFill>
+              </a:rPr>
+              <a:t>IoT</a:t>
+            </a:r>
+            <a:r>
+              <a:rPr kumimoji="1" lang="ja-JP" altLang="en-US" sz="2000">
+                <a:gradFill>
+                  <a:gsLst>
+                    <a:gs pos="2917">
+                      <a:schemeClr val="tx1"/>
+                    </a:gs>
+                    <a:gs pos="30000">
+                      <a:schemeClr val="tx1"/>
+                    </a:gs>
+                  </a:gsLst>
+                  <a:lin ang="5400000" scaled="0"/>
+                </a:gradFill>
+              </a:rPr>
+              <a:t> </a:t>
+            </a:r>
+            <a:r>
+              <a:rPr kumimoji="1" lang="en-US" altLang="ja-JP" sz="2000" dirty="0">
+                <a:gradFill>
+                  <a:gsLst>
+                    <a:gs pos="2917">
+                      <a:schemeClr val="tx1"/>
+                    </a:gs>
+                    <a:gs pos="30000">
+                      <a:schemeClr val="tx1"/>
+                    </a:gs>
+                  </a:gsLst>
+                  <a:lin ang="5400000" scaled="0"/>
+                </a:gradFill>
+              </a:rPr>
+              <a:t>Hub</a:t>
+            </a:r>
+            <a:r>
+              <a:rPr kumimoji="1" lang="ja-JP" altLang="en-US" sz="2000">
+                <a:gradFill>
+                  <a:gsLst>
+                    <a:gs pos="2917">
+                      <a:schemeClr val="tx1"/>
+                    </a:gs>
+                    <a:gs pos="30000">
+                      <a:schemeClr val="tx1"/>
+                    </a:gs>
+                  </a:gsLst>
+                  <a:lin ang="5400000" scaled="0"/>
+                </a:gradFill>
+              </a:rPr>
+              <a:t>に送信</a:t>
+            </a:r>
+            <a:endParaRPr kumimoji="1" lang="ja-JP" altLang="en-US" sz="2000" dirty="0" err="1">
+              <a:gradFill>
+                <a:gsLst>
+                  <a:gs pos="2917">
+                    <a:schemeClr val="tx1"/>
+                  </a:gs>
+                  <a:gs pos="30000">
+                    <a:schemeClr val="tx1"/>
+                  </a:gs>
+                </a:gsLst>
+                <a:lin ang="5400000" scaled="0"/>
+              </a:gradFill>
+            </a:endParaRPr>
+          </a:p>
+        </p:txBody>
+      </p:sp>
+    </p:spTree>
+    <p:extLst>
+      <p:ext uri="{BB962C8B-B14F-4D97-AF65-F5344CB8AC3E}">
+        <p14:creationId xmlns:p14="http://schemas.microsoft.com/office/powerpoint/2010/main" val="236922193"/>
+      </p:ext>
+    </p:extLst>
+  </p:cSld>
+  <p:clrMapOvr>
+    <a:masterClrMapping/>
+  </p:clrMapOvr>
+  <p:transition>
+    <p:fade/>
+  </p:transition>
+</p:sld>
+</file>
+
+<file path=ppt/slides/slide3.xml><?xml version="1.0" encoding="utf-8"?>
+<p:sld xmlns:a="http://schemas.openxmlformats.org/drawingml/2006/main" xmlns:r="http://schemas.openxmlformats.org/officeDocument/2006/relationships" xmlns:p="http://schemas.openxmlformats.org/presentationml/2006/main">
+  <p:cSld>
+    <p:spTree>
+      <p:nvGrpSpPr>
+        <p:cNvPr id="1" name=""/>
+        <p:cNvGrpSpPr/>
+        <p:nvPr/>
+      </p:nvGrpSpPr>
+      <p:grpSpPr>
+        <a:xfrm>
+          <a:off x="0" y="0"/>
+          <a:ext cx="0" cy="0"/>
+          <a:chOff x="0" y="0"/>
+          <a:chExt cx="0" cy="0"/>
+        </a:xfrm>
+      </p:grpSpPr>
       <p:sp>
         <p:nvSpPr>
           <p:cNvPr id="91" name="角丸四角形 90">
@@ -18719,7 +20522,7 @@
 </p:sld>
 </file>
 
-<file path=ppt/slides/slide3.xml><?xml version="1.0" encoding="utf-8"?>
+<file path=ppt/slides/slide4.xml><?xml version="1.0" encoding="utf-8"?>
 <p:sld xmlns:a="http://schemas.openxmlformats.org/drawingml/2006/main" xmlns:r="http://schemas.openxmlformats.org/officeDocument/2006/relationships" xmlns:p="http://schemas.openxmlformats.org/presentationml/2006/main">
   <p:cSld>
     <p:spTree>
@@ -22806,6 +24609,21 @@
 </file>
 
 <file path=customXml/item1.xml><?xml version="1.0" encoding="utf-8"?>
+<?mso-contentType ?>
+<FormTemplates xmlns="http://schemas.microsoft.com/sharepoint/v3/contenttype/forms">
+  <Display>DocumentLibraryForm</Display>
+  <Edit>DocumentLibraryForm</Edit>
+  <New>DocumentLibraryForm</New>
+</FormTemplates>
+</file>
+
+<file path=customXml/item2.xml><?xml version="1.0" encoding="utf-8"?>
+<p:properties xmlns:p="http://schemas.microsoft.com/office/2006/metadata/properties" xmlns:xsi="http://www.w3.org/2001/XMLSchema-instance" xmlns:pc="http://schemas.microsoft.com/office/infopath/2007/PartnerControls">
+  <documentManagement/>
+</p:properties>
+</file>
+
+<file path=customXml/item3.xml><?xml version="1.0" encoding="utf-8"?>
 <ct:contentTypeSchema xmlns:ct="http://schemas.microsoft.com/office/2006/metadata/contentType" xmlns:ma="http://schemas.microsoft.com/office/2006/metadata/properties/metaAttributes" ct:_="" ma:_="" ma:contentTypeName="Document" ma:contentTypeID="0x010100A2B0BB5962AB3C45A9A1CE1EC4C4F647" ma:contentTypeVersion="3" ma:contentTypeDescription="Create a new document." ma:contentTypeScope="" ma:versionID="f0876370c90de824ab54c09b0bd2a056">
   <xsd:schema xmlns:xsd="http://www.w3.org/2001/XMLSchema" xmlns:xs="http://www.w3.org/2001/XMLSchema" xmlns:p="http://schemas.microsoft.com/office/2006/metadata/properties" xmlns:ns3="630a2e83-186a-4a0f-ab27-bee8a8096abc" targetNamespace="http://schemas.microsoft.com/office/2006/metadata/properties" ma:root="true" ma:fieldsID="a2a3b5ed8b4accd7c8a398d0cb075271" ns3:_="">
     <xsd:import namespace="630a2e83-186a-4a0f-ab27-bee8a8096abc"/>
@@ -22959,35 +24777,10 @@
 </ct:contentTypeSchema>
 </file>
 
-<file path=customXml/item2.xml><?xml version="1.0" encoding="utf-8"?>
-<p:properties xmlns:p="http://schemas.microsoft.com/office/2006/metadata/properties" xmlns:xsi="http://www.w3.org/2001/XMLSchema-instance" xmlns:pc="http://schemas.microsoft.com/office/infopath/2007/PartnerControls">
-  <documentManagement/>
-</p:properties>
-</file>
-
-<file path=customXml/item3.xml><?xml version="1.0" encoding="utf-8"?>
-<?mso-contentType ?>
-<FormTemplates xmlns="http://schemas.microsoft.com/sharepoint/v3/contenttype/forms">
-  <Display>DocumentLibraryForm</Display>
-  <Edit>DocumentLibraryForm</Edit>
-  <New>DocumentLibraryForm</New>
-</FormTemplates>
-</file>
-
 <file path=customXml/itemProps1.xml><?xml version="1.0" encoding="utf-8"?>
-<ds:datastoreItem xmlns:ds="http://schemas.openxmlformats.org/officeDocument/2006/customXml" ds:itemID="{F330841A-A209-44E7-824E-9DDB4DE0DC3C}">
+<ds:datastoreItem xmlns:ds="http://schemas.openxmlformats.org/officeDocument/2006/customXml" ds:itemID="{758FDAC0-319D-4A54-8D8E-1D42CB1F8004}">
   <ds:schemaRefs>
-    <ds:schemaRef ds:uri="http://schemas.microsoft.com/office/2006/metadata/contentType"/>
-    <ds:schemaRef ds:uri="http://schemas.microsoft.com/office/2006/metadata/properties/metaAttributes"/>
-    <ds:schemaRef ds:uri="http://www.w3.org/2001/XMLSchema"/>
-    <ds:schemaRef ds:uri="http://schemas.microsoft.com/office/2006/metadata/properties"/>
-    <ds:schemaRef ds:uri="630a2e83-186a-4a0f-ab27-bee8a8096abc"/>
-    <ds:schemaRef ds:uri="http://schemas.microsoft.com/office/2006/documentManagement/types"/>
-    <ds:schemaRef ds:uri="http://schemas.microsoft.com/office/infopath/2007/PartnerControls"/>
-    <ds:schemaRef ds:uri="http://schemas.openxmlformats.org/package/2006/metadata/core-properties"/>
-    <ds:schemaRef ds:uri="http://purl.org/dc/elements/1.1/"/>
-    <ds:schemaRef ds:uri="http://purl.org/dc/terms/"/>
-    <ds:schemaRef ds:uri="http://schemas.microsoft.com/internal/obd"/>
+    <ds:schemaRef ds:uri="http://schemas.microsoft.com/sharepoint/v3/contenttype/forms"/>
   </ds:schemaRefs>
 </ds:datastoreItem>
 </file>
@@ -23009,9 +24802,19 @@
 </file>
 
 <file path=customXml/itemProps3.xml><?xml version="1.0" encoding="utf-8"?>
-<ds:datastoreItem xmlns:ds="http://schemas.openxmlformats.org/officeDocument/2006/customXml" ds:itemID="{758FDAC0-319D-4A54-8D8E-1D42CB1F8004}">
+<ds:datastoreItem xmlns:ds="http://schemas.openxmlformats.org/officeDocument/2006/customXml" ds:itemID="{F330841A-A209-44E7-824E-9DDB4DE0DC3C}">
   <ds:schemaRefs>
-    <ds:schemaRef ds:uri="http://schemas.microsoft.com/sharepoint/v3/contenttype/forms"/>
+    <ds:schemaRef ds:uri="http://schemas.microsoft.com/office/2006/metadata/contentType"/>
+    <ds:schemaRef ds:uri="http://schemas.microsoft.com/office/2006/metadata/properties/metaAttributes"/>
+    <ds:schemaRef ds:uri="http://www.w3.org/2001/XMLSchema"/>
+    <ds:schemaRef ds:uri="http://schemas.microsoft.com/office/2006/metadata/properties"/>
+    <ds:schemaRef ds:uri="630a2e83-186a-4a0f-ab27-bee8a8096abc"/>
+    <ds:schemaRef ds:uri="http://schemas.microsoft.com/office/2006/documentManagement/types"/>
+    <ds:schemaRef ds:uri="http://schemas.microsoft.com/office/infopath/2007/PartnerControls"/>
+    <ds:schemaRef ds:uri="http://schemas.openxmlformats.org/package/2006/metadata/core-properties"/>
+    <ds:schemaRef ds:uri="http://purl.org/dc/elements/1.1/"/>
+    <ds:schemaRef ds:uri="http://purl.org/dc/terms/"/>
+    <ds:schemaRef ds:uri="http://schemas.microsoft.com/internal/obd"/>
   </ds:schemaRefs>
 </ds:datastoreItem>
 </file>
</xml_diff>